<commit_message>
UPdate according to the change in the package structure of the library.
</commit_message>
<xml_diff>
--- a/RoadDesigner.pptx
+++ b/RoadDesigner.pptx
@@ -49,12 +49,17 @@
     <p:sldId id="307" r:id="rId43"/>
     <p:sldId id="308" r:id="rId44"/>
     <p:sldId id="309" r:id="rId45"/>
-    <p:sldId id="301" r:id="rId46"/>
-    <p:sldId id="302" r:id="rId47"/>
-    <p:sldId id="268" r:id="rId48"/>
-    <p:sldId id="269" r:id="rId49"/>
-    <p:sldId id="275" r:id="rId50"/>
-    <p:sldId id="270" r:id="rId51"/>
+    <p:sldId id="310" r:id="rId46"/>
+    <p:sldId id="311" r:id="rId47"/>
+    <p:sldId id="312" r:id="rId48"/>
+    <p:sldId id="313" r:id="rId49"/>
+    <p:sldId id="314" r:id="rId50"/>
+    <p:sldId id="301" r:id="rId51"/>
+    <p:sldId id="302" r:id="rId52"/>
+    <p:sldId id="268" r:id="rId53"/>
+    <p:sldId id="269" r:id="rId54"/>
+    <p:sldId id="275" r:id="rId55"/>
+    <p:sldId id="270" r:id="rId56"/>
   </p:sldIdLst>
   <p:sldSz cx="9144000" cy="6858000" type="screen4x3"/>
   <p:notesSz cx="6997700" cy="9283700"/>
@@ -337,7 +342,7 @@
           <a:p>
             <a:fld id="{2F0C258B-7F9F-4882-BAC1-54AC507C7770}" type="datetimeFigureOut">
               <a:rPr lang="en-US" smtClean="0"/>
-              <a:t>2/19/2014</a:t>
+              <a:t>2/20/2014</a:t>
             </a:fld>
             <a:endParaRPr lang="en-US"/>
           </a:p>
@@ -507,7 +512,7 @@
           <a:p>
             <a:fld id="{2F0C258B-7F9F-4882-BAC1-54AC507C7770}" type="datetimeFigureOut">
               <a:rPr lang="en-US" smtClean="0"/>
-              <a:t>2/19/2014</a:t>
+              <a:t>2/20/2014</a:t>
             </a:fld>
             <a:endParaRPr lang="en-US"/>
           </a:p>
@@ -687,7 +692,7 @@
           <a:p>
             <a:fld id="{2F0C258B-7F9F-4882-BAC1-54AC507C7770}" type="datetimeFigureOut">
               <a:rPr lang="en-US" smtClean="0"/>
-              <a:t>2/19/2014</a:t>
+              <a:t>2/20/2014</a:t>
             </a:fld>
             <a:endParaRPr lang="en-US"/>
           </a:p>
@@ -857,7 +862,7 @@
           <a:p>
             <a:fld id="{2F0C258B-7F9F-4882-BAC1-54AC507C7770}" type="datetimeFigureOut">
               <a:rPr lang="en-US" smtClean="0"/>
-              <a:t>2/19/2014</a:t>
+              <a:t>2/20/2014</a:t>
             </a:fld>
             <a:endParaRPr lang="en-US"/>
           </a:p>
@@ -1103,7 +1108,7 @@
           <a:p>
             <a:fld id="{2F0C258B-7F9F-4882-BAC1-54AC507C7770}" type="datetimeFigureOut">
               <a:rPr lang="en-US" smtClean="0"/>
-              <a:t>2/19/2014</a:t>
+              <a:t>2/20/2014</a:t>
             </a:fld>
             <a:endParaRPr lang="en-US"/>
           </a:p>
@@ -1391,7 +1396,7 @@
           <a:p>
             <a:fld id="{2F0C258B-7F9F-4882-BAC1-54AC507C7770}" type="datetimeFigureOut">
               <a:rPr lang="en-US" smtClean="0"/>
-              <a:t>2/19/2014</a:t>
+              <a:t>2/20/2014</a:t>
             </a:fld>
             <a:endParaRPr lang="en-US"/>
           </a:p>
@@ -1813,7 +1818,7 @@
           <a:p>
             <a:fld id="{2F0C258B-7F9F-4882-BAC1-54AC507C7770}" type="datetimeFigureOut">
               <a:rPr lang="en-US" smtClean="0"/>
-              <a:t>2/19/2014</a:t>
+              <a:t>2/20/2014</a:t>
             </a:fld>
             <a:endParaRPr lang="en-US"/>
           </a:p>
@@ -1931,7 +1936,7 @@
           <a:p>
             <a:fld id="{2F0C258B-7F9F-4882-BAC1-54AC507C7770}" type="datetimeFigureOut">
               <a:rPr lang="en-US" smtClean="0"/>
-              <a:t>2/19/2014</a:t>
+              <a:t>2/20/2014</a:t>
             </a:fld>
             <a:endParaRPr lang="en-US"/>
           </a:p>
@@ -2026,7 +2031,7 @@
           <a:p>
             <a:fld id="{2F0C258B-7F9F-4882-BAC1-54AC507C7770}" type="datetimeFigureOut">
               <a:rPr lang="en-US" smtClean="0"/>
-              <a:t>2/19/2014</a:t>
+              <a:t>2/20/2014</a:t>
             </a:fld>
             <a:endParaRPr lang="en-US"/>
           </a:p>
@@ -2303,7 +2308,7 @@
           <a:p>
             <a:fld id="{2F0C258B-7F9F-4882-BAC1-54AC507C7770}" type="datetimeFigureOut">
               <a:rPr lang="en-US" smtClean="0"/>
-              <a:t>2/19/2014</a:t>
+              <a:t>2/20/2014</a:t>
             </a:fld>
             <a:endParaRPr lang="en-US"/>
           </a:p>
@@ -2556,7 +2561,7 @@
           <a:p>
             <a:fld id="{2F0C258B-7F9F-4882-BAC1-54AC507C7770}" type="datetimeFigureOut">
               <a:rPr lang="en-US" smtClean="0"/>
-              <a:t>2/19/2014</a:t>
+              <a:t>2/20/2014</a:t>
             </a:fld>
             <a:endParaRPr lang="en-US"/>
           </a:p>
@@ -2769,7 +2774,7 @@
           <a:p>
             <a:fld id="{2F0C258B-7F9F-4882-BAC1-54AC507C7770}" type="datetimeFigureOut">
               <a:rPr lang="en-US" smtClean="0"/>
-              <a:t>2/19/2014</a:t>
+              <a:t>2/20/2014</a:t>
             </a:fld>
             <a:endParaRPr lang="en-US"/>
           </a:p>
@@ -12954,7 +12959,6 @@
               <a:rPr lang="en-US" altLang="ja-JP" sz="3200" dirty="0" smtClean="0"/>
               <a:t>kde_feature_g3.xml</a:t>
             </a:r>
-            <a:endParaRPr lang="en-US" altLang="ja-JP" sz="3200" dirty="0" smtClean="0"/>
           </a:p>
         </p:txBody>
       </p:sp>
@@ -13373,11 +13377,7 @@
             </a:r>
             <a:r>
               <a:rPr lang="ja-JP" altLang="en-US" sz="3200" dirty="0" smtClean="0"/>
-              <a:t>　　</a:t>
-            </a:r>
-            <a:r>
-              <a:rPr lang="ja-JP" altLang="en-US" sz="3200" dirty="0" smtClean="0"/>
-              <a:t>選択方式を検討したい。</a:t>
+              <a:t>　　選択方式を検討したい。</a:t>
             </a:r>
             <a:endParaRPr lang="en-US" altLang="ja-JP" sz="3200" dirty="0" smtClean="0"/>
           </a:p>
@@ -13502,7 +13502,7 @@
         </p:nvSpPr>
         <p:spPr>
           <a:xfrm>
-            <a:off x="2105025" y="2047875"/>
+            <a:off x="2057400" y="1524000"/>
             <a:ext cx="5162550" cy="3819525"/>
           </a:xfrm>
           <a:custGeom>
@@ -13607,7 +13607,7 @@
         </p:nvSpPr>
         <p:spPr>
           <a:xfrm>
-            <a:off x="3419475" y="3286125"/>
+            <a:off x="3371850" y="2762250"/>
             <a:ext cx="157163" cy="157163"/>
           </a:xfrm>
           <a:prstGeom prst="ellipse">
@@ -13655,7 +13655,7 @@
         </p:nvSpPr>
         <p:spPr>
           <a:xfrm>
-            <a:off x="3233737" y="4114800"/>
+            <a:off x="3186112" y="3590925"/>
             <a:ext cx="157163" cy="157163"/>
           </a:xfrm>
           <a:prstGeom prst="ellipse">
@@ -13703,7 +13703,7 @@
         </p:nvSpPr>
         <p:spPr>
           <a:xfrm>
-            <a:off x="3810000" y="4876800"/>
+            <a:off x="3762375" y="4352925"/>
             <a:ext cx="157163" cy="157163"/>
           </a:xfrm>
           <a:prstGeom prst="ellipse">
@@ -13751,7 +13751,7 @@
         </p:nvSpPr>
         <p:spPr>
           <a:xfrm>
-            <a:off x="5715000" y="4648200"/>
+            <a:off x="5667375" y="4124325"/>
             <a:ext cx="157163" cy="157163"/>
           </a:xfrm>
           <a:prstGeom prst="ellipse">
@@ -13799,7 +13799,7 @@
         </p:nvSpPr>
         <p:spPr>
           <a:xfrm>
-            <a:off x="4905375" y="2990850"/>
+            <a:off x="4857750" y="2466975"/>
             <a:ext cx="157163" cy="157163"/>
           </a:xfrm>
           <a:prstGeom prst="ellipse">
@@ -13850,7 +13850,7 @@
         </p:nvCxnSpPr>
         <p:spPr>
           <a:xfrm>
-            <a:off x="2524125" y="2676525"/>
+            <a:off x="2476500" y="2152650"/>
             <a:ext cx="1842291" cy="1304128"/>
           </a:xfrm>
           <a:prstGeom prst="line">
@@ -13886,7 +13886,7 @@
         </p:nvSpPr>
         <p:spPr>
           <a:xfrm>
-            <a:off x="4010025" y="4155281"/>
+            <a:off x="3962400" y="3631406"/>
             <a:ext cx="1231427" cy="369332"/>
           </a:xfrm>
           <a:prstGeom prst="rect">
@@ -13918,7 +13918,7 @@
         </p:nvCxnSpPr>
         <p:spPr>
           <a:xfrm flipH="1">
-            <a:off x="4429125" y="2047875"/>
+            <a:off x="4381500" y="1524000"/>
             <a:ext cx="1162050" cy="1981200"/>
           </a:xfrm>
           <a:prstGeom prst="line">
@@ -13956,7 +13956,7 @@
         </p:nvCxnSpPr>
         <p:spPr>
           <a:xfrm flipH="1" flipV="1">
-            <a:off x="4438650" y="4029075"/>
+            <a:off x="4391025" y="3505200"/>
             <a:ext cx="2828925" cy="1409700"/>
           </a:xfrm>
           <a:prstGeom prst="line">
@@ -13992,7 +13992,7 @@
         </p:nvCxnSpPr>
         <p:spPr>
           <a:xfrm flipV="1">
-            <a:off x="3343275" y="4029075"/>
+            <a:off x="3295650" y="3505200"/>
             <a:ext cx="1104900" cy="1838326"/>
           </a:xfrm>
           <a:prstGeom prst="line">
@@ -14030,7 +14030,7 @@
         </p:nvCxnSpPr>
         <p:spPr>
           <a:xfrm flipV="1">
-            <a:off x="2105025" y="4057650"/>
+            <a:off x="2057400" y="3533775"/>
             <a:ext cx="2343150" cy="266700"/>
           </a:xfrm>
           <a:prstGeom prst="line">
@@ -14066,7 +14066,7 @@
         </p:nvSpPr>
         <p:spPr>
           <a:xfrm>
-            <a:off x="4343400" y="3957637"/>
+            <a:off x="4295775" y="3433762"/>
             <a:ext cx="157163" cy="157163"/>
           </a:xfrm>
           <a:prstGeom prst="ellipse">
@@ -14103,6 +14103,62 @@
           <a:p>
             <a:pPr algn="ctr"/>
             <a:endParaRPr lang="en-US"/>
+          </a:p>
+        </p:txBody>
+      </p:sp>
+      <p:sp>
+        <p:nvSpPr>
+          <p:cNvPr id="16" name="TextBox 15"/>
+          <p:cNvSpPr txBox="1"/>
+          <p:nvPr/>
+        </p:nvSpPr>
+        <p:spPr>
+          <a:xfrm>
+            <a:off x="1" y="5288340"/>
+            <a:ext cx="9144000" cy="1569660"/>
+          </a:xfrm>
+          <a:prstGeom prst="rect">
+            <a:avLst/>
+          </a:prstGeom>
+          <a:noFill/>
+        </p:spPr>
+        <p:txBody>
+          <a:bodyPr wrap="square" rtlCol="0">
+            <a:spAutoFit/>
+          </a:bodyPr>
+          <a:lstStyle/>
+          <a:p>
+            <a:r>
+              <a:rPr lang="ja-JP" altLang="en-US" sz="3200" dirty="0" smtClean="0"/>
+              <a:t>⇒よく考えたら、もとの領域内は、ほぼ完璧に再現</a:t>
+            </a:r>
+            <a:endParaRPr lang="en-US" altLang="ja-JP" sz="3200" dirty="0" smtClean="0"/>
+          </a:p>
+          <a:p>
+            <a:r>
+              <a:rPr lang="ja-JP" altLang="en-US" sz="3200" dirty="0"/>
+              <a:t>　</a:t>
+            </a:r>
+            <a:r>
+              <a:rPr lang="ja-JP" altLang="en-US" sz="3200" dirty="0" smtClean="0"/>
+              <a:t>　</a:t>
+            </a:r>
+            <a:r>
+              <a:rPr lang="ja-JP" altLang="en-US" sz="3200" dirty="0" smtClean="0"/>
+              <a:t>できるので、シードは１個で十分だ。</a:t>
+            </a:r>
+            <a:endParaRPr lang="en-US" altLang="ja-JP" sz="3200" dirty="0" smtClean="0"/>
+          </a:p>
+          <a:p>
+            <a:r>
+              <a:rPr lang="ja-JP" altLang="en-US" sz="3200" dirty="0"/>
+              <a:t>　</a:t>
+            </a:r>
+            <a:r>
+              <a:rPr lang="ja-JP" altLang="en-US" sz="3200" dirty="0" smtClean="0"/>
+              <a:t>　問題は、もとの領域の外だ。。。。</a:t>
+            </a:r>
+            <a:endParaRPr lang="en-US" altLang="ja-JP" sz="3200" dirty="0" smtClean="0"/>
           </a:p>
         </p:txBody>
       </p:sp>
@@ -14120,6 +14176,2147 @@
 </file>
 
 <file path=ppt/slides/slide45.xml><?xml version="1.0" encoding="utf-8"?>
+<p:sld xmlns:a="http://schemas.openxmlformats.org/drawingml/2006/main" xmlns:r="http://schemas.openxmlformats.org/officeDocument/2006/relationships" xmlns:p="http://schemas.openxmlformats.org/presentationml/2006/main">
+  <p:cSld>
+    <p:spTree>
+      <p:nvGrpSpPr>
+        <p:cNvPr id="1" name=""/>
+        <p:cNvGrpSpPr/>
+        <p:nvPr/>
+      </p:nvGrpSpPr>
+      <p:grpSpPr>
+        <a:xfrm>
+          <a:off x="0" y="0"/>
+          <a:ext cx="0" cy="0"/>
+          <a:chOff x="0" y="0"/>
+          <a:chExt cx="0" cy="0"/>
+        </a:xfrm>
+      </p:grpSpPr>
+      <p:pic>
+        <p:nvPicPr>
+          <p:cNvPr id="1026" name="Picture 2"/>
+          <p:cNvPicPr>
+            <a:picLocks noChangeAspect="1" noChangeArrowheads="1"/>
+          </p:cNvPicPr>
+          <p:nvPr/>
+        </p:nvPicPr>
+        <p:blipFill>
+          <a:blip r:embed="rId2" cstate="print">
+            <a:extLst>
+              <a:ext uri="{28A0092B-C50C-407E-A947-70E740481C1C}">
+                <a14:useLocalDpi xmlns:a14="http://schemas.microsoft.com/office/drawing/2010/main" val="0"/>
+              </a:ext>
+            </a:extLst>
+          </a:blip>
+          <a:srcRect/>
+          <a:stretch>
+            <a:fillRect/>
+          </a:stretch>
+        </p:blipFill>
+        <p:spPr bwMode="auto">
+          <a:xfrm>
+            <a:off x="381000" y="1340061"/>
+            <a:ext cx="1524000" cy="1531410"/>
+          </a:xfrm>
+          <a:prstGeom prst="rect">
+            <a:avLst/>
+          </a:prstGeom>
+          <a:noFill/>
+          <a:ln>
+            <a:noFill/>
+          </a:ln>
+          <a:extLst>
+            <a:ext uri="{909E8E84-426E-40DD-AFC4-6F175D3DCCD1}">
+              <a14:hiddenFill xmlns:a14="http://schemas.microsoft.com/office/drawing/2010/main">
+                <a:solidFill>
+                  <a:schemeClr val="accent1"/>
+                </a:solidFill>
+              </a14:hiddenFill>
+            </a:ext>
+            <a:ext uri="{91240B29-F687-4F45-9708-019B960494DF}">
+              <a14:hiddenLine xmlns:a14="http://schemas.microsoft.com/office/drawing/2010/main" w="9525">
+                <a:solidFill>
+                  <a:schemeClr val="tx1"/>
+                </a:solidFill>
+                <a:miter lim="800000"/>
+                <a:headEnd/>
+                <a:tailEnd/>
+              </a14:hiddenLine>
+            </a:ext>
+          </a:extLst>
+        </p:spPr>
+      </p:pic>
+      <p:sp>
+        <p:nvSpPr>
+          <p:cNvPr id="3" name="TextBox 2"/>
+          <p:cNvSpPr txBox="1"/>
+          <p:nvPr/>
+        </p:nvSpPr>
+        <p:spPr>
+          <a:xfrm>
+            <a:off x="1" y="-13195"/>
+            <a:ext cx="9144000" cy="1077218"/>
+          </a:xfrm>
+          <a:prstGeom prst="rect">
+            <a:avLst/>
+          </a:prstGeom>
+          <a:noFill/>
+        </p:spPr>
+        <p:txBody>
+          <a:bodyPr wrap="square" rtlCol="0">
+            <a:spAutoFit/>
+          </a:bodyPr>
+          <a:lstStyle/>
+          <a:p>
+            <a:r>
+              <a:rPr lang="ja-JP" altLang="en-US" sz="3200" dirty="0"/>
+              <a:t>そ</a:t>
+            </a:r>
+            <a:r>
+              <a:rPr lang="ja-JP" altLang="en-US" sz="3200" dirty="0" smtClean="0"/>
+              <a:t>の前に、そもそもサンフランシスコをなぜ再現できなかったのか？⇒元の領域内は、再現できてた。</a:t>
+            </a:r>
+            <a:endParaRPr lang="en-US" altLang="ja-JP" sz="3200" dirty="0" smtClean="0"/>
+          </a:p>
+        </p:txBody>
+      </p:sp>
+      <p:pic>
+        <p:nvPicPr>
+          <p:cNvPr id="1027" name="Picture 3"/>
+          <p:cNvPicPr>
+            <a:picLocks noChangeAspect="1" noChangeArrowheads="1"/>
+          </p:cNvPicPr>
+          <p:nvPr/>
+        </p:nvPicPr>
+        <p:blipFill>
+          <a:blip r:embed="rId3" cstate="print">
+            <a:extLst>
+              <a:ext uri="{28A0092B-C50C-407E-A947-70E740481C1C}">
+                <a14:useLocalDpi xmlns:a14="http://schemas.microsoft.com/office/drawing/2010/main" val="0"/>
+              </a:ext>
+            </a:extLst>
+          </a:blip>
+          <a:srcRect/>
+          <a:stretch>
+            <a:fillRect/>
+          </a:stretch>
+        </p:blipFill>
+        <p:spPr bwMode="auto">
+          <a:xfrm>
+            <a:off x="1981200" y="1350559"/>
+            <a:ext cx="1533217" cy="1520912"/>
+          </a:xfrm>
+          <a:prstGeom prst="rect">
+            <a:avLst/>
+          </a:prstGeom>
+          <a:noFill/>
+          <a:ln>
+            <a:noFill/>
+          </a:ln>
+          <a:extLst>
+            <a:ext uri="{909E8E84-426E-40DD-AFC4-6F175D3DCCD1}">
+              <a14:hiddenFill xmlns:a14="http://schemas.microsoft.com/office/drawing/2010/main">
+                <a:solidFill>
+                  <a:schemeClr val="accent1"/>
+                </a:solidFill>
+              </a14:hiddenFill>
+            </a:ext>
+            <a:ext uri="{91240B29-F687-4F45-9708-019B960494DF}">
+              <a14:hiddenLine xmlns:a14="http://schemas.microsoft.com/office/drawing/2010/main" w="9525">
+                <a:solidFill>
+                  <a:schemeClr val="tx1"/>
+                </a:solidFill>
+                <a:miter lim="800000"/>
+                <a:headEnd/>
+                <a:tailEnd/>
+              </a14:hiddenLine>
+            </a:ext>
+          </a:extLst>
+        </p:spPr>
+      </p:pic>
+      <p:pic>
+        <p:nvPicPr>
+          <p:cNvPr id="1028" name="Picture 4"/>
+          <p:cNvPicPr>
+            <a:picLocks noChangeAspect="1" noChangeArrowheads="1"/>
+          </p:cNvPicPr>
+          <p:nvPr/>
+        </p:nvPicPr>
+        <p:blipFill>
+          <a:blip r:embed="rId4" cstate="print">
+            <a:extLst>
+              <a:ext uri="{28A0092B-C50C-407E-A947-70E740481C1C}">
+                <a14:useLocalDpi xmlns:a14="http://schemas.microsoft.com/office/drawing/2010/main" val="0"/>
+              </a:ext>
+            </a:extLst>
+          </a:blip>
+          <a:srcRect/>
+          <a:stretch>
+            <a:fillRect/>
+          </a:stretch>
+        </p:blipFill>
+        <p:spPr bwMode="auto">
+          <a:xfrm>
+            <a:off x="3581400" y="1350559"/>
+            <a:ext cx="1533217" cy="1533217"/>
+          </a:xfrm>
+          <a:prstGeom prst="rect">
+            <a:avLst/>
+          </a:prstGeom>
+          <a:noFill/>
+          <a:ln>
+            <a:noFill/>
+          </a:ln>
+          <a:extLst>
+            <a:ext uri="{909E8E84-426E-40DD-AFC4-6F175D3DCCD1}">
+              <a14:hiddenFill xmlns:a14="http://schemas.microsoft.com/office/drawing/2010/main">
+                <a:solidFill>
+                  <a:schemeClr val="accent1"/>
+                </a:solidFill>
+              </a14:hiddenFill>
+            </a:ext>
+            <a:ext uri="{91240B29-F687-4F45-9708-019B960494DF}">
+              <a14:hiddenLine xmlns:a14="http://schemas.microsoft.com/office/drawing/2010/main" w="9525">
+                <a:solidFill>
+                  <a:schemeClr val="tx1"/>
+                </a:solidFill>
+                <a:miter lim="800000"/>
+                <a:headEnd/>
+                <a:tailEnd/>
+              </a14:hiddenLine>
+            </a:ext>
+          </a:extLst>
+        </p:spPr>
+      </p:pic>
+      <p:pic>
+        <p:nvPicPr>
+          <p:cNvPr id="1029" name="Picture 5"/>
+          <p:cNvPicPr>
+            <a:picLocks noChangeAspect="1" noChangeArrowheads="1"/>
+          </p:cNvPicPr>
+          <p:nvPr/>
+        </p:nvPicPr>
+        <p:blipFill>
+          <a:blip r:embed="rId5" cstate="print">
+            <a:extLst>
+              <a:ext uri="{28A0092B-C50C-407E-A947-70E740481C1C}">
+                <a14:useLocalDpi xmlns:a14="http://schemas.microsoft.com/office/drawing/2010/main" val="0"/>
+              </a:ext>
+            </a:extLst>
+          </a:blip>
+          <a:srcRect/>
+          <a:stretch>
+            <a:fillRect/>
+          </a:stretch>
+        </p:blipFill>
+        <p:spPr bwMode="auto">
+          <a:xfrm>
+            <a:off x="5200650" y="1350559"/>
+            <a:ext cx="1524000" cy="1531339"/>
+          </a:xfrm>
+          <a:prstGeom prst="rect">
+            <a:avLst/>
+          </a:prstGeom>
+          <a:noFill/>
+          <a:ln>
+            <a:noFill/>
+          </a:ln>
+          <a:extLst>
+            <a:ext uri="{909E8E84-426E-40DD-AFC4-6F175D3DCCD1}">
+              <a14:hiddenFill xmlns:a14="http://schemas.microsoft.com/office/drawing/2010/main">
+                <a:solidFill>
+                  <a:schemeClr val="accent1"/>
+                </a:solidFill>
+              </a14:hiddenFill>
+            </a:ext>
+            <a:ext uri="{91240B29-F687-4F45-9708-019B960494DF}">
+              <a14:hiddenLine xmlns:a14="http://schemas.microsoft.com/office/drawing/2010/main" w="9525">
+                <a:solidFill>
+                  <a:schemeClr val="tx1"/>
+                </a:solidFill>
+                <a:miter lim="800000"/>
+                <a:headEnd/>
+                <a:tailEnd/>
+              </a14:hiddenLine>
+            </a:ext>
+          </a:extLst>
+        </p:spPr>
+      </p:pic>
+      <p:pic>
+        <p:nvPicPr>
+          <p:cNvPr id="1030" name="Picture 6"/>
+          <p:cNvPicPr>
+            <a:picLocks noChangeAspect="1" noChangeArrowheads="1"/>
+          </p:cNvPicPr>
+          <p:nvPr/>
+        </p:nvPicPr>
+        <p:blipFill>
+          <a:blip r:embed="rId6" cstate="print">
+            <a:extLst>
+              <a:ext uri="{28A0092B-C50C-407E-A947-70E740481C1C}">
+                <a14:useLocalDpi xmlns:a14="http://schemas.microsoft.com/office/drawing/2010/main" val="0"/>
+              </a:ext>
+            </a:extLst>
+          </a:blip>
+          <a:srcRect/>
+          <a:stretch>
+            <a:fillRect/>
+          </a:stretch>
+        </p:blipFill>
+        <p:spPr bwMode="auto">
+          <a:xfrm>
+            <a:off x="6858000" y="1350560"/>
+            <a:ext cx="1516014" cy="1520912"/>
+          </a:xfrm>
+          <a:prstGeom prst="rect">
+            <a:avLst/>
+          </a:prstGeom>
+          <a:noFill/>
+          <a:ln>
+            <a:noFill/>
+          </a:ln>
+          <a:extLst>
+            <a:ext uri="{909E8E84-426E-40DD-AFC4-6F175D3DCCD1}">
+              <a14:hiddenFill xmlns:a14="http://schemas.microsoft.com/office/drawing/2010/main">
+                <a:solidFill>
+                  <a:schemeClr val="accent1"/>
+                </a:solidFill>
+              </a14:hiddenFill>
+            </a:ext>
+            <a:ext uri="{91240B29-F687-4F45-9708-019B960494DF}">
+              <a14:hiddenLine xmlns:a14="http://schemas.microsoft.com/office/drawing/2010/main" w="9525">
+                <a:solidFill>
+                  <a:schemeClr val="tx1"/>
+                </a:solidFill>
+                <a:miter lim="800000"/>
+                <a:headEnd/>
+                <a:tailEnd/>
+              </a14:hiddenLine>
+            </a:ext>
+          </a:extLst>
+        </p:spPr>
+      </p:pic>
+      <p:pic>
+        <p:nvPicPr>
+          <p:cNvPr id="8" name="Picture 2"/>
+          <p:cNvPicPr>
+            <a:picLocks noChangeAspect="1" noChangeArrowheads="1"/>
+          </p:cNvPicPr>
+          <p:nvPr/>
+        </p:nvPicPr>
+        <p:blipFill>
+          <a:blip r:embed="rId7">
+            <a:extLst>
+              <a:ext uri="{28A0092B-C50C-407E-A947-70E740481C1C}">
+                <a14:useLocalDpi xmlns:a14="http://schemas.microsoft.com/office/drawing/2010/main" val="0"/>
+              </a:ext>
+            </a:extLst>
+          </a:blip>
+          <a:srcRect/>
+          <a:stretch>
+            <a:fillRect/>
+          </a:stretch>
+        </p:blipFill>
+        <p:spPr bwMode="auto">
+          <a:xfrm>
+            <a:off x="5334000" y="3158609"/>
+            <a:ext cx="3432993" cy="3383508"/>
+          </a:xfrm>
+          <a:prstGeom prst="rect">
+            <a:avLst/>
+          </a:prstGeom>
+          <a:noFill/>
+          <a:ln>
+            <a:noFill/>
+          </a:ln>
+          <a:extLst>
+            <a:ext uri="{909E8E84-426E-40DD-AFC4-6F175D3DCCD1}">
+              <a14:hiddenFill xmlns:a14="http://schemas.microsoft.com/office/drawing/2010/main">
+                <a:solidFill>
+                  <a:schemeClr val="accent1"/>
+                </a:solidFill>
+              </a14:hiddenFill>
+            </a:ext>
+            <a:ext uri="{91240B29-F687-4F45-9708-019B960494DF}">
+              <a14:hiddenLine xmlns:a14="http://schemas.microsoft.com/office/drawing/2010/main" w="9525">
+                <a:solidFill>
+                  <a:schemeClr val="tx1"/>
+                </a:solidFill>
+                <a:miter lim="800000"/>
+                <a:headEnd/>
+                <a:tailEnd/>
+              </a14:hiddenLine>
+            </a:ext>
+          </a:extLst>
+        </p:spPr>
+      </p:pic>
+      <p:pic>
+        <p:nvPicPr>
+          <p:cNvPr id="1031" name="Picture 7"/>
+          <p:cNvPicPr>
+            <a:picLocks noChangeAspect="1" noChangeArrowheads="1"/>
+          </p:cNvPicPr>
+          <p:nvPr/>
+        </p:nvPicPr>
+        <p:blipFill>
+          <a:blip r:embed="rId8" cstate="print">
+            <a:extLst>
+              <a:ext uri="{28A0092B-C50C-407E-A947-70E740481C1C}">
+                <a14:useLocalDpi xmlns:a14="http://schemas.microsoft.com/office/drawing/2010/main" val="0"/>
+              </a:ext>
+            </a:extLst>
+          </a:blip>
+          <a:srcRect/>
+          <a:stretch>
+            <a:fillRect/>
+          </a:stretch>
+        </p:blipFill>
+        <p:spPr bwMode="auto">
+          <a:xfrm>
+            <a:off x="381000" y="3173034"/>
+            <a:ext cx="1524000" cy="1519100"/>
+          </a:xfrm>
+          <a:prstGeom prst="rect">
+            <a:avLst/>
+          </a:prstGeom>
+          <a:noFill/>
+          <a:ln>
+            <a:noFill/>
+          </a:ln>
+          <a:extLst>
+            <a:ext uri="{909E8E84-426E-40DD-AFC4-6F175D3DCCD1}">
+              <a14:hiddenFill xmlns:a14="http://schemas.microsoft.com/office/drawing/2010/main">
+                <a:solidFill>
+                  <a:schemeClr val="accent1"/>
+                </a:solidFill>
+              </a14:hiddenFill>
+            </a:ext>
+            <a:ext uri="{91240B29-F687-4F45-9708-019B960494DF}">
+              <a14:hiddenLine xmlns:a14="http://schemas.microsoft.com/office/drawing/2010/main" w="9525">
+                <a:solidFill>
+                  <a:schemeClr val="tx1"/>
+                </a:solidFill>
+                <a:miter lim="800000"/>
+                <a:headEnd/>
+                <a:tailEnd/>
+              </a14:hiddenLine>
+            </a:ext>
+          </a:extLst>
+        </p:spPr>
+      </p:pic>
+      <p:sp>
+        <p:nvSpPr>
+          <p:cNvPr id="2" name="TextBox 1"/>
+          <p:cNvSpPr txBox="1"/>
+          <p:nvPr/>
+        </p:nvSpPr>
+        <p:spPr>
+          <a:xfrm>
+            <a:off x="504716" y="4692134"/>
+            <a:ext cx="1276568" cy="369332"/>
+          </a:xfrm>
+          <a:prstGeom prst="rect">
+            <a:avLst/>
+          </a:prstGeom>
+          <a:noFill/>
+        </p:spPr>
+        <p:txBody>
+          <a:bodyPr wrap="none" rtlCol="0">
+            <a:spAutoFit/>
+          </a:bodyPr>
+          <a:lstStyle/>
+          <a:p>
+            <a:r>
+              <a:rPr lang="en-US" dirty="0" smtClean="0"/>
+              <a:t>Iteration 20</a:t>
+            </a:r>
+            <a:endParaRPr lang="en-US" dirty="0"/>
+          </a:p>
+        </p:txBody>
+      </p:sp>
+      <p:pic>
+        <p:nvPicPr>
+          <p:cNvPr id="1032" name="Picture 8"/>
+          <p:cNvPicPr>
+            <a:picLocks noChangeAspect="1" noChangeArrowheads="1"/>
+          </p:cNvPicPr>
+          <p:nvPr/>
+        </p:nvPicPr>
+        <p:blipFill>
+          <a:blip r:embed="rId9" cstate="print">
+            <a:extLst>
+              <a:ext uri="{28A0092B-C50C-407E-A947-70E740481C1C}">
+                <a14:useLocalDpi xmlns:a14="http://schemas.microsoft.com/office/drawing/2010/main" val="0"/>
+              </a:ext>
+            </a:extLst>
+          </a:blip>
+          <a:srcRect/>
+          <a:stretch>
+            <a:fillRect/>
+          </a:stretch>
+        </p:blipFill>
+        <p:spPr bwMode="auto">
+          <a:xfrm>
+            <a:off x="1981200" y="3168134"/>
+            <a:ext cx="3352800" cy="3296664"/>
+          </a:xfrm>
+          <a:prstGeom prst="rect">
+            <a:avLst/>
+          </a:prstGeom>
+          <a:noFill/>
+          <a:ln>
+            <a:noFill/>
+          </a:ln>
+          <a:extLst>
+            <a:ext uri="{909E8E84-426E-40DD-AFC4-6F175D3DCCD1}">
+              <a14:hiddenFill xmlns:a14="http://schemas.microsoft.com/office/drawing/2010/main">
+                <a:solidFill>
+                  <a:schemeClr val="accent1"/>
+                </a:solidFill>
+              </a14:hiddenFill>
+            </a:ext>
+            <a:ext uri="{91240B29-F687-4F45-9708-019B960494DF}">
+              <a14:hiddenLine xmlns:a14="http://schemas.microsoft.com/office/drawing/2010/main" w="9525">
+                <a:solidFill>
+                  <a:schemeClr val="tx1"/>
+                </a:solidFill>
+                <a:miter lim="800000"/>
+                <a:headEnd/>
+                <a:tailEnd/>
+              </a14:hiddenLine>
+            </a:ext>
+          </a:extLst>
+        </p:spPr>
+      </p:pic>
+      <p:sp>
+        <p:nvSpPr>
+          <p:cNvPr id="12" name="TextBox 11"/>
+          <p:cNvSpPr txBox="1"/>
+          <p:nvPr/>
+        </p:nvSpPr>
+        <p:spPr>
+          <a:xfrm>
+            <a:off x="3019316" y="6447881"/>
+            <a:ext cx="1276568" cy="369332"/>
+          </a:xfrm>
+          <a:prstGeom prst="rect">
+            <a:avLst/>
+          </a:prstGeom>
+          <a:noFill/>
+        </p:spPr>
+        <p:txBody>
+          <a:bodyPr wrap="none" rtlCol="0">
+            <a:spAutoFit/>
+          </a:bodyPr>
+          <a:lstStyle/>
+          <a:p>
+            <a:r>
+              <a:rPr lang="en-US" dirty="0" smtClean="0"/>
+              <a:t>Iteration 60</a:t>
+            </a:r>
+            <a:endParaRPr lang="en-US" dirty="0"/>
+          </a:p>
+        </p:txBody>
+      </p:sp>
+      <p:sp>
+        <p:nvSpPr>
+          <p:cNvPr id="5" name="Freeform 4"/>
+          <p:cNvSpPr/>
+          <p:nvPr/>
+        </p:nvSpPr>
+        <p:spPr>
+          <a:xfrm>
+            <a:off x="2667000" y="3914775"/>
+            <a:ext cx="2152650" cy="2076450"/>
+          </a:xfrm>
+          <a:custGeom>
+            <a:avLst/>
+            <a:gdLst>
+              <a:gd name="connsiteX0" fmla="*/ 1295400 w 2152650"/>
+              <a:gd name="connsiteY0" fmla="*/ 57150 h 2076450"/>
+              <a:gd name="connsiteX1" fmla="*/ 1543050 w 2152650"/>
+              <a:gd name="connsiteY1" fmla="*/ 0 h 2076450"/>
+              <a:gd name="connsiteX2" fmla="*/ 2152650 w 2152650"/>
+              <a:gd name="connsiteY2" fmla="*/ 857250 h 2076450"/>
+              <a:gd name="connsiteX3" fmla="*/ 923925 w 2152650"/>
+              <a:gd name="connsiteY3" fmla="*/ 2076450 h 2076450"/>
+              <a:gd name="connsiteX4" fmla="*/ 190500 w 2152650"/>
+              <a:gd name="connsiteY4" fmla="*/ 1419225 h 2076450"/>
+              <a:gd name="connsiteX5" fmla="*/ 0 w 2152650"/>
+              <a:gd name="connsiteY5" fmla="*/ 323850 h 2076450"/>
+              <a:gd name="connsiteX6" fmla="*/ 1295400 w 2152650"/>
+              <a:gd name="connsiteY6" fmla="*/ 57150 h 2076450"/>
+            </a:gdLst>
+            <a:ahLst/>
+            <a:cxnLst>
+              <a:cxn ang="0">
+                <a:pos x="connsiteX0" y="connsiteY0"/>
+              </a:cxn>
+              <a:cxn ang="0">
+                <a:pos x="connsiteX1" y="connsiteY1"/>
+              </a:cxn>
+              <a:cxn ang="0">
+                <a:pos x="connsiteX2" y="connsiteY2"/>
+              </a:cxn>
+              <a:cxn ang="0">
+                <a:pos x="connsiteX3" y="connsiteY3"/>
+              </a:cxn>
+              <a:cxn ang="0">
+                <a:pos x="connsiteX4" y="connsiteY4"/>
+              </a:cxn>
+              <a:cxn ang="0">
+                <a:pos x="connsiteX5" y="connsiteY5"/>
+              </a:cxn>
+              <a:cxn ang="0">
+                <a:pos x="connsiteX6" y="connsiteY6"/>
+              </a:cxn>
+            </a:cxnLst>
+            <a:rect l="l" t="t" r="r" b="b"/>
+            <a:pathLst>
+              <a:path w="2152650" h="2076450">
+                <a:moveTo>
+                  <a:pt x="1295400" y="57150"/>
+                </a:moveTo>
+                <a:lnTo>
+                  <a:pt x="1543050" y="0"/>
+                </a:lnTo>
+                <a:lnTo>
+                  <a:pt x="2152650" y="857250"/>
+                </a:lnTo>
+                <a:lnTo>
+                  <a:pt x="923925" y="2076450"/>
+                </a:lnTo>
+                <a:lnTo>
+                  <a:pt x="190500" y="1419225"/>
+                </a:lnTo>
+                <a:lnTo>
+                  <a:pt x="0" y="323850"/>
+                </a:lnTo>
+                <a:lnTo>
+                  <a:pt x="1295400" y="57150"/>
+                </a:lnTo>
+                <a:close/>
+              </a:path>
+            </a:pathLst>
+          </a:custGeom>
+          <a:noFill/>
+          <a:ln>
+            <a:solidFill>
+              <a:schemeClr val="tx1"/>
+            </a:solidFill>
+            <a:prstDash val="dash"/>
+          </a:ln>
+        </p:spPr>
+        <p:style>
+          <a:lnRef idx="2">
+            <a:schemeClr val="accent1">
+              <a:shade val="50000"/>
+            </a:schemeClr>
+          </a:lnRef>
+          <a:fillRef idx="1">
+            <a:schemeClr val="accent1"/>
+          </a:fillRef>
+          <a:effectRef idx="0">
+            <a:schemeClr val="accent1"/>
+          </a:effectRef>
+          <a:fontRef idx="minor">
+            <a:schemeClr val="lt1"/>
+          </a:fontRef>
+        </p:style>
+        <p:txBody>
+          <a:bodyPr rtlCol="0" anchor="ctr"/>
+          <a:lstStyle/>
+          <a:p>
+            <a:pPr algn="ctr"/>
+            <a:endParaRPr lang="en-US"/>
+          </a:p>
+        </p:txBody>
+      </p:sp>
+      <p:sp>
+        <p:nvSpPr>
+          <p:cNvPr id="6" name="Oval 5"/>
+          <p:cNvSpPr/>
+          <p:nvPr/>
+        </p:nvSpPr>
+        <p:spPr>
+          <a:xfrm>
+            <a:off x="3238500" y="3352800"/>
+            <a:ext cx="304800" cy="304800"/>
+          </a:xfrm>
+          <a:prstGeom prst="ellipse">
+            <a:avLst/>
+          </a:prstGeom>
+          <a:noFill/>
+          <a:ln>
+            <a:solidFill>
+              <a:schemeClr val="tx1"/>
+            </a:solidFill>
+            <a:prstDash val="dash"/>
+          </a:ln>
+        </p:spPr>
+        <p:style>
+          <a:lnRef idx="2">
+            <a:schemeClr val="accent1">
+              <a:shade val="50000"/>
+            </a:schemeClr>
+          </a:lnRef>
+          <a:fillRef idx="1">
+            <a:schemeClr val="accent1"/>
+          </a:fillRef>
+          <a:effectRef idx="0">
+            <a:schemeClr val="accent1"/>
+          </a:effectRef>
+          <a:fontRef idx="minor">
+            <a:schemeClr val="lt1"/>
+          </a:fontRef>
+        </p:style>
+        <p:txBody>
+          <a:bodyPr rtlCol="0" anchor="ctr"/>
+          <a:lstStyle/>
+          <a:p>
+            <a:pPr algn="ctr"/>
+            <a:endParaRPr lang="en-US"/>
+          </a:p>
+        </p:txBody>
+      </p:sp>
+      <p:sp>
+        <p:nvSpPr>
+          <p:cNvPr id="16" name="TextBox 15"/>
+          <p:cNvSpPr txBox="1"/>
+          <p:nvPr/>
+        </p:nvSpPr>
+        <p:spPr>
+          <a:xfrm>
+            <a:off x="2057400" y="2983468"/>
+            <a:ext cx="3272050" cy="369332"/>
+          </a:xfrm>
+          <a:prstGeom prst="rect">
+            <a:avLst/>
+          </a:prstGeom>
+          <a:noFill/>
+        </p:spPr>
+        <p:txBody>
+          <a:bodyPr wrap="none" rtlCol="0">
+            <a:spAutoFit/>
+          </a:bodyPr>
+          <a:lstStyle/>
+          <a:p>
+            <a:r>
+              <a:rPr lang="ja-JP" altLang="en-US" dirty="0"/>
+              <a:t>な</a:t>
+            </a:r>
+            <a:r>
+              <a:rPr lang="ja-JP" altLang="en-US" dirty="0" smtClean="0"/>
+              <a:t>ぜここで、Ｔ字が選択された？</a:t>
+            </a:r>
+            <a:endParaRPr lang="en-US" dirty="0"/>
+          </a:p>
+        </p:txBody>
+      </p:sp>
+      <p:sp>
+        <p:nvSpPr>
+          <p:cNvPr id="17" name="Oval 16"/>
+          <p:cNvSpPr/>
+          <p:nvPr/>
+        </p:nvSpPr>
+        <p:spPr>
+          <a:xfrm>
+            <a:off x="6436625" y="4038600"/>
+            <a:ext cx="304800" cy="304800"/>
+          </a:xfrm>
+          <a:prstGeom prst="ellipse">
+            <a:avLst/>
+          </a:prstGeom>
+          <a:noFill/>
+          <a:ln>
+            <a:solidFill>
+              <a:schemeClr val="tx1"/>
+            </a:solidFill>
+            <a:prstDash val="dash"/>
+          </a:ln>
+        </p:spPr>
+        <p:style>
+          <a:lnRef idx="2">
+            <a:schemeClr val="accent1">
+              <a:shade val="50000"/>
+            </a:schemeClr>
+          </a:lnRef>
+          <a:fillRef idx="1">
+            <a:schemeClr val="accent1"/>
+          </a:fillRef>
+          <a:effectRef idx="0">
+            <a:schemeClr val="accent1"/>
+          </a:effectRef>
+          <a:fontRef idx="minor">
+            <a:schemeClr val="lt1"/>
+          </a:fontRef>
+        </p:style>
+        <p:txBody>
+          <a:bodyPr rtlCol="0" anchor="ctr"/>
+          <a:lstStyle/>
+          <a:p>
+            <a:pPr algn="ctr"/>
+            <a:endParaRPr lang="en-US"/>
+          </a:p>
+        </p:txBody>
+      </p:sp>
+      <p:sp>
+        <p:nvSpPr>
+          <p:cNvPr id="18" name="TextBox 17"/>
+          <p:cNvSpPr txBox="1"/>
+          <p:nvPr/>
+        </p:nvSpPr>
+        <p:spPr>
+          <a:xfrm>
+            <a:off x="5221975" y="3467100"/>
+            <a:ext cx="3866764" cy="1477328"/>
+          </a:xfrm>
+          <a:prstGeom prst="rect">
+            <a:avLst/>
+          </a:prstGeom>
+          <a:noFill/>
+        </p:spPr>
+        <p:txBody>
+          <a:bodyPr wrap="none" rtlCol="0">
+            <a:spAutoFit/>
+          </a:bodyPr>
+          <a:lstStyle/>
+          <a:p>
+            <a:r>
+              <a:rPr lang="ja-JP" altLang="en-US" dirty="0" smtClean="0"/>
+              <a:t>このカーネルが選択されていた。</a:t>
+            </a:r>
+            <a:endParaRPr lang="en-US" altLang="ja-JP" dirty="0" smtClean="0"/>
+          </a:p>
+          <a:p>
+            <a:r>
+              <a:rPr lang="ja-JP" altLang="en-US" dirty="0" smtClean="0"/>
+              <a:t>でも、こ</a:t>
+            </a:r>
+            <a:r>
+              <a:rPr lang="ja-JP" altLang="en-US" dirty="0"/>
+              <a:t>れ</a:t>
+            </a:r>
+            <a:r>
+              <a:rPr lang="ja-JP" altLang="en-US" dirty="0" smtClean="0"/>
+              <a:t>は仕方がない。</a:t>
+            </a:r>
+            <a:endParaRPr lang="en-US" altLang="ja-JP" dirty="0" smtClean="0"/>
+          </a:p>
+          <a:p>
+            <a:endParaRPr lang="en-US" dirty="0"/>
+          </a:p>
+          <a:p>
+            <a:r>
+              <a:rPr lang="ja-JP" altLang="en-US" dirty="0" smtClean="0"/>
+              <a:t>これが選択されても、良い結果に</a:t>
+            </a:r>
+            <a:endParaRPr lang="en-US" altLang="ja-JP" dirty="0" smtClean="0"/>
+          </a:p>
+          <a:p>
+            <a:r>
+              <a:rPr lang="ja-JP" altLang="en-US" dirty="0"/>
+              <a:t>なるような</a:t>
+            </a:r>
+            <a:r>
+              <a:rPr lang="ja-JP" altLang="en-US" dirty="0" smtClean="0"/>
+              <a:t>、何らかのアイデアが必要。</a:t>
+            </a:r>
+            <a:endParaRPr lang="en-US" dirty="0"/>
+          </a:p>
+        </p:txBody>
+      </p:sp>
+    </p:spTree>
+    <p:extLst>
+      <p:ext uri="{BB962C8B-B14F-4D97-AF65-F5344CB8AC3E}">
+        <p14:creationId xmlns:p14="http://schemas.microsoft.com/office/powerpoint/2010/main" val="2662155873"/>
+      </p:ext>
+    </p:extLst>
+  </p:cSld>
+  <p:clrMapOvr>
+    <a:masterClrMapping/>
+  </p:clrMapOvr>
+</p:sld>
+</file>
+
+<file path=ppt/slides/slide46.xml><?xml version="1.0" encoding="utf-8"?>
+<p:sld xmlns:a="http://schemas.openxmlformats.org/drawingml/2006/main" xmlns:r="http://schemas.openxmlformats.org/officeDocument/2006/relationships" xmlns:p="http://schemas.openxmlformats.org/presentationml/2006/main">
+  <p:cSld>
+    <p:spTree>
+      <p:nvGrpSpPr>
+        <p:cNvPr id="1" name=""/>
+        <p:cNvGrpSpPr/>
+        <p:nvPr/>
+      </p:nvGrpSpPr>
+      <p:grpSpPr>
+        <a:xfrm>
+          <a:off x="0" y="0"/>
+          <a:ext cx="0" cy="0"/>
+          <a:chOff x="0" y="0"/>
+          <a:chExt cx="0" cy="0"/>
+        </a:xfrm>
+      </p:grpSpPr>
+      <p:pic>
+        <p:nvPicPr>
+          <p:cNvPr id="2050" name="Picture 2"/>
+          <p:cNvPicPr>
+            <a:picLocks noChangeAspect="1" noChangeArrowheads="1"/>
+          </p:cNvPicPr>
+          <p:nvPr/>
+        </p:nvPicPr>
+        <p:blipFill>
+          <a:blip r:embed="rId2">
+            <a:extLst>
+              <a:ext uri="{28A0092B-C50C-407E-A947-70E740481C1C}">
+                <a14:useLocalDpi xmlns:a14="http://schemas.microsoft.com/office/drawing/2010/main" val="0"/>
+              </a:ext>
+            </a:extLst>
+          </a:blip>
+          <a:srcRect/>
+          <a:stretch>
+            <a:fillRect/>
+          </a:stretch>
+        </p:blipFill>
+        <p:spPr bwMode="auto">
+          <a:xfrm>
+            <a:off x="76200" y="914400"/>
+            <a:ext cx="4385653" cy="5029200"/>
+          </a:xfrm>
+          <a:prstGeom prst="rect">
+            <a:avLst/>
+          </a:prstGeom>
+          <a:noFill/>
+          <a:ln>
+            <a:noFill/>
+          </a:ln>
+          <a:extLst>
+            <a:ext uri="{909E8E84-426E-40DD-AFC4-6F175D3DCCD1}">
+              <a14:hiddenFill xmlns:a14="http://schemas.microsoft.com/office/drawing/2010/main">
+                <a:solidFill>
+                  <a:schemeClr val="accent1"/>
+                </a:solidFill>
+              </a14:hiddenFill>
+            </a:ext>
+            <a:ext uri="{91240B29-F687-4F45-9708-019B960494DF}">
+              <a14:hiddenLine xmlns:a14="http://schemas.microsoft.com/office/drawing/2010/main" w="9525">
+                <a:solidFill>
+                  <a:schemeClr val="tx1"/>
+                </a:solidFill>
+                <a:miter lim="800000"/>
+                <a:headEnd/>
+                <a:tailEnd/>
+              </a14:hiddenLine>
+            </a:ext>
+          </a:extLst>
+        </p:spPr>
+      </p:pic>
+      <p:sp>
+        <p:nvSpPr>
+          <p:cNvPr id="3" name="TextBox 2"/>
+          <p:cNvSpPr txBox="1"/>
+          <p:nvPr/>
+        </p:nvSpPr>
+        <p:spPr>
+          <a:xfrm>
+            <a:off x="1" y="-13195"/>
+            <a:ext cx="9144000" cy="584775"/>
+          </a:xfrm>
+          <a:prstGeom prst="rect">
+            <a:avLst/>
+          </a:prstGeom>
+          <a:noFill/>
+        </p:spPr>
+        <p:txBody>
+          <a:bodyPr wrap="square" rtlCol="0">
+            <a:spAutoFit/>
+          </a:bodyPr>
+          <a:lstStyle/>
+          <a:p>
+            <a:r>
+              <a:rPr lang="ja-JP" altLang="en-US" sz="3200" dirty="0" smtClean="0"/>
+              <a:t>左上の領域を広げて、カーネルを増やしてみよう。</a:t>
+            </a:r>
+            <a:endParaRPr lang="en-US" altLang="ja-JP" sz="3200" dirty="0" smtClean="0"/>
+          </a:p>
+        </p:txBody>
+      </p:sp>
+      <p:pic>
+        <p:nvPicPr>
+          <p:cNvPr id="2051" name="Picture 3"/>
+          <p:cNvPicPr>
+            <a:picLocks noChangeAspect="1" noChangeArrowheads="1"/>
+          </p:cNvPicPr>
+          <p:nvPr/>
+        </p:nvPicPr>
+        <p:blipFill>
+          <a:blip r:embed="rId3">
+            <a:extLst>
+              <a:ext uri="{28A0092B-C50C-407E-A947-70E740481C1C}">
+                <a14:useLocalDpi xmlns:a14="http://schemas.microsoft.com/office/drawing/2010/main" val="0"/>
+              </a:ext>
+            </a:extLst>
+          </a:blip>
+          <a:srcRect/>
+          <a:stretch>
+            <a:fillRect/>
+          </a:stretch>
+        </p:blipFill>
+        <p:spPr bwMode="auto">
+          <a:xfrm>
+            <a:off x="4876800" y="895764"/>
+            <a:ext cx="4008154" cy="5047836"/>
+          </a:xfrm>
+          <a:prstGeom prst="rect">
+            <a:avLst/>
+          </a:prstGeom>
+          <a:noFill/>
+          <a:ln>
+            <a:noFill/>
+          </a:ln>
+          <a:extLst>
+            <a:ext uri="{909E8E84-426E-40DD-AFC4-6F175D3DCCD1}">
+              <a14:hiddenFill xmlns:a14="http://schemas.microsoft.com/office/drawing/2010/main">
+                <a:solidFill>
+                  <a:schemeClr val="accent1"/>
+                </a:solidFill>
+              </a14:hiddenFill>
+            </a:ext>
+            <a:ext uri="{91240B29-F687-4F45-9708-019B960494DF}">
+              <a14:hiddenLine xmlns:a14="http://schemas.microsoft.com/office/drawing/2010/main" w="9525">
+                <a:solidFill>
+                  <a:schemeClr val="tx1"/>
+                </a:solidFill>
+                <a:miter lim="800000"/>
+                <a:headEnd/>
+                <a:tailEnd/>
+              </a14:hiddenLine>
+            </a:ext>
+          </a:extLst>
+        </p:spPr>
+      </p:pic>
+    </p:spTree>
+    <p:extLst>
+      <p:ext uri="{BB962C8B-B14F-4D97-AF65-F5344CB8AC3E}">
+        <p14:creationId xmlns:p14="http://schemas.microsoft.com/office/powerpoint/2010/main" val="17615884"/>
+      </p:ext>
+    </p:extLst>
+  </p:cSld>
+  <p:clrMapOvr>
+    <a:masterClrMapping/>
+  </p:clrMapOvr>
+</p:sld>
+</file>
+
+<file path=ppt/slides/slide47.xml><?xml version="1.0" encoding="utf-8"?>
+<p:sld xmlns:a="http://schemas.openxmlformats.org/drawingml/2006/main" xmlns:r="http://schemas.openxmlformats.org/officeDocument/2006/relationships" xmlns:p="http://schemas.openxmlformats.org/presentationml/2006/main">
+  <p:cSld>
+    <p:spTree>
+      <p:nvGrpSpPr>
+        <p:cNvPr id="1" name=""/>
+        <p:cNvGrpSpPr/>
+        <p:nvPr/>
+      </p:nvGrpSpPr>
+      <p:grpSpPr>
+        <a:xfrm>
+          <a:off x="0" y="0"/>
+          <a:ext cx="0" cy="0"/>
+          <a:chOff x="0" y="0"/>
+          <a:chExt cx="0" cy="0"/>
+        </a:xfrm>
+      </p:grpSpPr>
+      <p:pic>
+        <p:nvPicPr>
+          <p:cNvPr id="3075" name="Picture 3"/>
+          <p:cNvPicPr>
+            <a:picLocks noChangeAspect="1" noChangeArrowheads="1"/>
+          </p:cNvPicPr>
+          <p:nvPr/>
+        </p:nvPicPr>
+        <p:blipFill>
+          <a:blip r:embed="rId2">
+            <a:extLst>
+              <a:ext uri="{28A0092B-C50C-407E-A947-70E740481C1C}">
+                <a14:useLocalDpi xmlns:a14="http://schemas.microsoft.com/office/drawing/2010/main" val="0"/>
+              </a:ext>
+            </a:extLst>
+          </a:blip>
+          <a:srcRect/>
+          <a:stretch>
+            <a:fillRect/>
+          </a:stretch>
+        </p:blipFill>
+        <p:spPr bwMode="auto">
+          <a:xfrm>
+            <a:off x="1676400" y="1295400"/>
+            <a:ext cx="5351653" cy="5362575"/>
+          </a:xfrm>
+          <a:prstGeom prst="rect">
+            <a:avLst/>
+          </a:prstGeom>
+          <a:noFill/>
+          <a:ln>
+            <a:noFill/>
+          </a:ln>
+          <a:extLst>
+            <a:ext uri="{909E8E84-426E-40DD-AFC4-6F175D3DCCD1}">
+              <a14:hiddenFill xmlns:a14="http://schemas.microsoft.com/office/drawing/2010/main">
+                <a:solidFill>
+                  <a:schemeClr val="accent1"/>
+                </a:solidFill>
+              </a14:hiddenFill>
+            </a:ext>
+            <a:ext uri="{91240B29-F687-4F45-9708-019B960494DF}">
+              <a14:hiddenLine xmlns:a14="http://schemas.microsoft.com/office/drawing/2010/main" w="9525">
+                <a:solidFill>
+                  <a:schemeClr val="tx1"/>
+                </a:solidFill>
+                <a:miter lim="800000"/>
+                <a:headEnd/>
+                <a:tailEnd/>
+              </a14:hiddenLine>
+            </a:ext>
+          </a:extLst>
+        </p:spPr>
+      </p:pic>
+      <p:sp>
+        <p:nvSpPr>
+          <p:cNvPr id="4" name="TextBox 3"/>
+          <p:cNvSpPr txBox="1"/>
+          <p:nvPr/>
+        </p:nvSpPr>
+        <p:spPr>
+          <a:xfrm>
+            <a:off x="1" y="-13195"/>
+            <a:ext cx="9144000" cy="584775"/>
+          </a:xfrm>
+          <a:prstGeom prst="rect">
+            <a:avLst/>
+          </a:prstGeom>
+          <a:noFill/>
+        </p:spPr>
+        <p:txBody>
+          <a:bodyPr wrap="square" rtlCol="0">
+            <a:spAutoFit/>
+          </a:bodyPr>
+          <a:lstStyle/>
+          <a:p>
+            <a:r>
+              <a:rPr lang="ja-JP" altLang="en-US" sz="3200" dirty="0" smtClean="0"/>
+              <a:t>結果は、良くなった。</a:t>
+            </a:r>
+            <a:endParaRPr lang="en-US" altLang="ja-JP" sz="3200" dirty="0" smtClean="0"/>
+          </a:p>
+        </p:txBody>
+      </p:sp>
+    </p:spTree>
+    <p:extLst>
+      <p:ext uri="{BB962C8B-B14F-4D97-AF65-F5344CB8AC3E}">
+        <p14:creationId xmlns:p14="http://schemas.microsoft.com/office/powerpoint/2010/main" val="3548315790"/>
+      </p:ext>
+    </p:extLst>
+  </p:cSld>
+  <p:clrMapOvr>
+    <a:masterClrMapping/>
+  </p:clrMapOvr>
+</p:sld>
+</file>
+
+<file path=ppt/slides/slide48.xml><?xml version="1.0" encoding="utf-8"?>
+<p:sld xmlns:a="http://schemas.openxmlformats.org/drawingml/2006/main" xmlns:r="http://schemas.openxmlformats.org/officeDocument/2006/relationships" xmlns:p="http://schemas.openxmlformats.org/presentationml/2006/main">
+  <p:cSld>
+    <p:spTree>
+      <p:nvGrpSpPr>
+        <p:cNvPr id="1" name=""/>
+        <p:cNvGrpSpPr/>
+        <p:nvPr/>
+      </p:nvGrpSpPr>
+      <p:grpSpPr>
+        <a:xfrm>
+          <a:off x="0" y="0"/>
+          <a:ext cx="0" cy="0"/>
+          <a:chOff x="0" y="0"/>
+          <a:chExt cx="0" cy="0"/>
+        </a:xfrm>
+      </p:grpSpPr>
+      <p:pic>
+        <p:nvPicPr>
+          <p:cNvPr id="4098" name="Picture 2"/>
+          <p:cNvPicPr>
+            <a:picLocks noChangeAspect="1" noChangeArrowheads="1"/>
+          </p:cNvPicPr>
+          <p:nvPr/>
+        </p:nvPicPr>
+        <p:blipFill>
+          <a:blip r:embed="rId2">
+            <a:extLst>
+              <a:ext uri="{28A0092B-C50C-407E-A947-70E740481C1C}">
+                <a14:useLocalDpi xmlns:a14="http://schemas.microsoft.com/office/drawing/2010/main" val="0"/>
+              </a:ext>
+            </a:extLst>
+          </a:blip>
+          <a:srcRect/>
+          <a:stretch>
+            <a:fillRect/>
+          </a:stretch>
+        </p:blipFill>
+        <p:spPr bwMode="auto">
+          <a:xfrm>
+            <a:off x="1776413" y="1219200"/>
+            <a:ext cx="5439946" cy="5482050"/>
+          </a:xfrm>
+          <a:prstGeom prst="rect">
+            <a:avLst/>
+          </a:prstGeom>
+          <a:noFill/>
+          <a:ln>
+            <a:noFill/>
+          </a:ln>
+          <a:extLst>
+            <a:ext uri="{909E8E84-426E-40DD-AFC4-6F175D3DCCD1}">
+              <a14:hiddenFill xmlns:a14="http://schemas.microsoft.com/office/drawing/2010/main">
+                <a:solidFill>
+                  <a:schemeClr val="accent1"/>
+                </a:solidFill>
+              </a14:hiddenFill>
+            </a:ext>
+            <a:ext uri="{91240B29-F687-4F45-9708-019B960494DF}">
+              <a14:hiddenLine xmlns:a14="http://schemas.microsoft.com/office/drawing/2010/main" w="9525">
+                <a:solidFill>
+                  <a:schemeClr val="tx1"/>
+                </a:solidFill>
+                <a:miter lim="800000"/>
+                <a:headEnd/>
+                <a:tailEnd/>
+              </a14:hiddenLine>
+            </a:ext>
+          </a:extLst>
+        </p:spPr>
+      </p:pic>
+      <p:sp>
+        <p:nvSpPr>
+          <p:cNvPr id="2" name="TextBox 1"/>
+          <p:cNvSpPr txBox="1"/>
+          <p:nvPr/>
+        </p:nvSpPr>
+        <p:spPr>
+          <a:xfrm>
+            <a:off x="1" y="-13195"/>
+            <a:ext cx="9144000" cy="2062103"/>
+          </a:xfrm>
+          <a:prstGeom prst="rect">
+            <a:avLst/>
+          </a:prstGeom>
+          <a:noFill/>
+        </p:spPr>
+        <p:txBody>
+          <a:bodyPr wrap="square" rtlCol="0">
+            <a:spAutoFit/>
+          </a:bodyPr>
+          <a:lstStyle/>
+          <a:p>
+            <a:r>
+              <a:rPr lang="ja-JP" altLang="en-US" sz="3200" dirty="0" smtClean="0"/>
+              <a:t>もっと広い領域だと</a:t>
+            </a:r>
+            <a:endParaRPr lang="en-US" altLang="ja-JP" sz="3200" dirty="0" smtClean="0"/>
+          </a:p>
+          <a:p>
+            <a:r>
+              <a:rPr lang="ja-JP" altLang="en-US" sz="3200" dirty="0" smtClean="0"/>
+              <a:t>⇒　やはり、だいぶ良くなった。</a:t>
+            </a:r>
+            <a:r>
+              <a:rPr lang="en-US" altLang="ja-JP" sz="3200" dirty="0" err="1" smtClean="0"/>
+              <a:t>Boulverd</a:t>
+            </a:r>
+            <a:r>
+              <a:rPr lang="ja-JP" altLang="en-US" sz="3200" dirty="0" smtClean="0"/>
+              <a:t>が欲しいな。</a:t>
+            </a:r>
+            <a:endParaRPr lang="en-US" altLang="ja-JP" sz="3200" dirty="0" smtClean="0"/>
+          </a:p>
+          <a:p>
+            <a:r>
+              <a:rPr lang="ja-JP" altLang="en-US" sz="3200" dirty="0" smtClean="0"/>
+              <a:t>⇒　いや、</a:t>
+            </a:r>
+            <a:r>
+              <a:rPr lang="ja-JP" altLang="en-US" sz="3200" dirty="0"/>
+              <a:t>もとの</a:t>
+            </a:r>
+            <a:r>
+              <a:rPr lang="ja-JP" altLang="en-US" sz="3200" dirty="0" smtClean="0"/>
+              <a:t>領域自体が、</a:t>
+            </a:r>
+            <a:r>
+              <a:rPr lang="en-US" altLang="ja-JP" sz="3200" dirty="0" err="1" smtClean="0"/>
+              <a:t>Bouldverd</a:t>
+            </a:r>
+            <a:r>
+              <a:rPr lang="ja-JP" altLang="en-US" sz="3200" dirty="0" smtClean="0"/>
+              <a:t>をまたぐ</a:t>
+            </a:r>
+            <a:endParaRPr lang="en-US" altLang="ja-JP" sz="3200" dirty="0" smtClean="0"/>
+          </a:p>
+          <a:p>
+            <a:r>
+              <a:rPr lang="ja-JP" altLang="en-US" sz="3200" dirty="0"/>
+              <a:t>　</a:t>
+            </a:r>
+            <a:r>
+              <a:rPr lang="ja-JP" altLang="en-US" sz="3200" dirty="0" smtClean="0"/>
+              <a:t>　べきではないのでは？</a:t>
+            </a:r>
+            <a:endParaRPr lang="en-US" altLang="ja-JP" sz="3200" dirty="0" smtClean="0"/>
+          </a:p>
+        </p:txBody>
+      </p:sp>
+    </p:spTree>
+    <p:extLst>
+      <p:ext uri="{BB962C8B-B14F-4D97-AF65-F5344CB8AC3E}">
+        <p14:creationId xmlns:p14="http://schemas.microsoft.com/office/powerpoint/2010/main" val="3090825502"/>
+      </p:ext>
+    </p:extLst>
+  </p:cSld>
+  <p:clrMapOvr>
+    <a:masterClrMapping/>
+  </p:clrMapOvr>
+</p:sld>
+</file>
+
+<file path=ppt/slides/slide49.xml><?xml version="1.0" encoding="utf-8"?>
+<p:sld xmlns:a="http://schemas.openxmlformats.org/drawingml/2006/main" xmlns:r="http://schemas.openxmlformats.org/officeDocument/2006/relationships" xmlns:p="http://schemas.openxmlformats.org/presentationml/2006/main">
+  <p:cSld>
+    <p:spTree>
+      <p:nvGrpSpPr>
+        <p:cNvPr id="1" name=""/>
+        <p:cNvGrpSpPr/>
+        <p:nvPr/>
+      </p:nvGrpSpPr>
+      <p:grpSpPr>
+        <a:xfrm>
+          <a:off x="0" y="0"/>
+          <a:ext cx="0" cy="0"/>
+          <a:chOff x="0" y="0"/>
+          <a:chExt cx="0" cy="0"/>
+        </a:xfrm>
+      </p:grpSpPr>
+      <p:pic>
+        <p:nvPicPr>
+          <p:cNvPr id="5122" name="Picture 2"/>
+          <p:cNvPicPr>
+            <a:picLocks noChangeAspect="1" noChangeArrowheads="1"/>
+          </p:cNvPicPr>
+          <p:nvPr/>
+        </p:nvPicPr>
+        <p:blipFill>
+          <a:blip r:embed="rId2">
+            <a:extLst>
+              <a:ext uri="{28A0092B-C50C-407E-A947-70E740481C1C}">
+                <a14:useLocalDpi xmlns:a14="http://schemas.microsoft.com/office/drawing/2010/main" val="0"/>
+              </a:ext>
+            </a:extLst>
+          </a:blip>
+          <a:srcRect/>
+          <a:stretch>
+            <a:fillRect/>
+          </a:stretch>
+        </p:blipFill>
+        <p:spPr bwMode="auto">
+          <a:xfrm>
+            <a:off x="4205287" y="1924050"/>
+            <a:ext cx="4919663" cy="4838285"/>
+          </a:xfrm>
+          <a:prstGeom prst="rect">
+            <a:avLst/>
+          </a:prstGeom>
+          <a:noFill/>
+          <a:ln>
+            <a:noFill/>
+          </a:ln>
+          <a:extLst>
+            <a:ext uri="{909E8E84-426E-40DD-AFC4-6F175D3DCCD1}">
+              <a14:hiddenFill xmlns:a14="http://schemas.microsoft.com/office/drawing/2010/main">
+                <a:solidFill>
+                  <a:schemeClr val="accent1"/>
+                </a:solidFill>
+              </a14:hiddenFill>
+            </a:ext>
+            <a:ext uri="{91240B29-F687-4F45-9708-019B960494DF}">
+              <a14:hiddenLine xmlns:a14="http://schemas.microsoft.com/office/drawing/2010/main" w="9525">
+                <a:solidFill>
+                  <a:schemeClr val="tx1"/>
+                </a:solidFill>
+                <a:miter lim="800000"/>
+                <a:headEnd/>
+                <a:tailEnd/>
+              </a14:hiddenLine>
+            </a:ext>
+          </a:extLst>
+        </p:spPr>
+      </p:pic>
+      <p:sp>
+        <p:nvSpPr>
+          <p:cNvPr id="3" name="TextBox 2"/>
+          <p:cNvSpPr txBox="1"/>
+          <p:nvPr/>
+        </p:nvSpPr>
+        <p:spPr>
+          <a:xfrm>
+            <a:off x="1" y="-13195"/>
+            <a:ext cx="9144000" cy="1569660"/>
+          </a:xfrm>
+          <a:prstGeom prst="rect">
+            <a:avLst/>
+          </a:prstGeom>
+          <a:noFill/>
+        </p:spPr>
+        <p:txBody>
+          <a:bodyPr wrap="square" rtlCol="0">
+            <a:spAutoFit/>
+          </a:bodyPr>
+          <a:lstStyle/>
+          <a:p>
+            <a:r>
+              <a:rPr lang="ja-JP" altLang="en-US" sz="3200" dirty="0" smtClean="0"/>
+              <a:t>さて、</a:t>
+            </a:r>
+            <a:r>
+              <a:rPr lang="en-US" altLang="ja-JP" sz="3200" dirty="0" smtClean="0"/>
+              <a:t>Street</a:t>
+            </a:r>
+            <a:r>
+              <a:rPr lang="ja-JP" altLang="en-US" sz="3200" dirty="0" smtClean="0"/>
+              <a:t>の生成はどうか？</a:t>
+            </a:r>
+            <a:endParaRPr lang="en-US" altLang="ja-JP" sz="3200" dirty="0" smtClean="0"/>
+          </a:p>
+          <a:p>
+            <a:r>
+              <a:rPr lang="ja-JP" altLang="en-US" sz="3200" dirty="0" smtClean="0"/>
+              <a:t>⇒まず、サンプルの左上の</a:t>
+            </a:r>
+            <a:r>
+              <a:rPr lang="en-US" altLang="ja-JP" sz="3200" dirty="0" err="1" smtClean="0"/>
+              <a:t>Boulverd</a:t>
+            </a:r>
+            <a:r>
+              <a:rPr lang="ja-JP" altLang="en-US" sz="3200" dirty="0" smtClean="0"/>
+              <a:t>が邪魔だ。</a:t>
+            </a:r>
+            <a:endParaRPr lang="en-US" altLang="ja-JP" sz="3200" dirty="0" smtClean="0"/>
+          </a:p>
+          <a:p>
+            <a:r>
+              <a:rPr lang="ja-JP" altLang="en-US" sz="3200" dirty="0" smtClean="0"/>
+              <a:t>⇒あと、やはり</a:t>
+            </a:r>
+            <a:r>
+              <a:rPr lang="ja-JP" altLang="en-US" sz="3200" dirty="0"/>
+              <a:t>類</a:t>
+            </a:r>
+            <a:r>
+              <a:rPr lang="ja-JP" altLang="en-US" sz="3200" dirty="0" smtClean="0"/>
+              <a:t>似</a:t>
+            </a:r>
+            <a:r>
+              <a:rPr lang="en-US" altLang="ja-JP" sz="3200" dirty="0" smtClean="0"/>
+              <a:t>Face</a:t>
+            </a:r>
+            <a:r>
+              <a:rPr lang="ja-JP" altLang="en-US" sz="3200" dirty="0" smtClean="0"/>
+              <a:t>の</a:t>
+            </a:r>
+            <a:r>
+              <a:rPr lang="en-US" altLang="ja-JP" sz="3200" dirty="0" smtClean="0"/>
+              <a:t>Street</a:t>
+            </a:r>
+            <a:r>
+              <a:rPr lang="ja-JP" altLang="en-US" sz="3200" dirty="0" smtClean="0"/>
+              <a:t>を使用すべきだ。</a:t>
+            </a:r>
+            <a:endParaRPr lang="en-US" altLang="ja-JP" sz="3200" dirty="0" smtClean="0"/>
+          </a:p>
+        </p:txBody>
+      </p:sp>
+      <p:pic>
+        <p:nvPicPr>
+          <p:cNvPr id="4" name="Picture 2"/>
+          <p:cNvPicPr>
+            <a:picLocks noChangeAspect="1" noChangeArrowheads="1"/>
+          </p:cNvPicPr>
+          <p:nvPr/>
+        </p:nvPicPr>
+        <p:blipFill>
+          <a:blip r:embed="rId3">
+            <a:extLst>
+              <a:ext uri="{28A0092B-C50C-407E-A947-70E740481C1C}">
+                <a14:useLocalDpi xmlns:a14="http://schemas.microsoft.com/office/drawing/2010/main" val="0"/>
+              </a:ext>
+            </a:extLst>
+          </a:blip>
+          <a:srcRect/>
+          <a:stretch>
+            <a:fillRect/>
+          </a:stretch>
+        </p:blipFill>
+        <p:spPr bwMode="auto">
+          <a:xfrm>
+            <a:off x="114300" y="2140640"/>
+            <a:ext cx="4038599" cy="4631220"/>
+          </a:xfrm>
+          <a:prstGeom prst="rect">
+            <a:avLst/>
+          </a:prstGeom>
+          <a:noFill/>
+          <a:ln>
+            <a:noFill/>
+          </a:ln>
+          <a:extLst>
+            <a:ext uri="{909E8E84-426E-40DD-AFC4-6F175D3DCCD1}">
+              <a14:hiddenFill xmlns:a14="http://schemas.microsoft.com/office/drawing/2010/main">
+                <a:solidFill>
+                  <a:schemeClr val="accent1"/>
+                </a:solidFill>
+              </a14:hiddenFill>
+            </a:ext>
+            <a:ext uri="{91240B29-F687-4F45-9708-019B960494DF}">
+              <a14:hiddenLine xmlns:a14="http://schemas.microsoft.com/office/drawing/2010/main" w="9525">
+                <a:solidFill>
+                  <a:schemeClr val="tx1"/>
+                </a:solidFill>
+                <a:miter lim="800000"/>
+                <a:headEnd/>
+                <a:tailEnd/>
+              </a14:hiddenLine>
+            </a:ext>
+          </a:extLst>
+        </p:spPr>
+      </p:pic>
+      <p:sp>
+        <p:nvSpPr>
+          <p:cNvPr id="2" name="Oval 1"/>
+          <p:cNvSpPr/>
+          <p:nvPr/>
+        </p:nvSpPr>
+        <p:spPr>
+          <a:xfrm rot="21074808">
+            <a:off x="-63378" y="2790334"/>
+            <a:ext cx="4267200" cy="388958"/>
+          </a:xfrm>
+          <a:prstGeom prst="ellipse">
+            <a:avLst/>
+          </a:prstGeom>
+          <a:noFill/>
+          <a:ln>
+            <a:solidFill>
+              <a:schemeClr val="tx1"/>
+            </a:solidFill>
+            <a:prstDash val="dash"/>
+          </a:ln>
+        </p:spPr>
+        <p:style>
+          <a:lnRef idx="2">
+            <a:schemeClr val="accent1">
+              <a:shade val="50000"/>
+            </a:schemeClr>
+          </a:lnRef>
+          <a:fillRef idx="1">
+            <a:schemeClr val="accent1"/>
+          </a:fillRef>
+          <a:effectRef idx="0">
+            <a:schemeClr val="accent1"/>
+          </a:effectRef>
+          <a:fontRef idx="minor">
+            <a:schemeClr val="lt1"/>
+          </a:fontRef>
+        </p:style>
+        <p:txBody>
+          <a:bodyPr rtlCol="0" anchor="ctr"/>
+          <a:lstStyle/>
+          <a:p>
+            <a:pPr algn="ctr"/>
+            <a:endParaRPr lang="en-US"/>
+          </a:p>
+        </p:txBody>
+      </p:sp>
+    </p:spTree>
+    <p:extLst>
+      <p:ext uri="{BB962C8B-B14F-4D97-AF65-F5344CB8AC3E}">
+        <p14:creationId xmlns:p14="http://schemas.microsoft.com/office/powerpoint/2010/main" val="2260915333"/>
+      </p:ext>
+    </p:extLst>
+  </p:cSld>
+  <p:clrMapOvr>
+    <a:masterClrMapping/>
+  </p:clrMapOvr>
+</p:sld>
+</file>
+
+<file path=ppt/slides/slide5.xml><?xml version="1.0" encoding="utf-8"?>
+<p:sld xmlns:a="http://schemas.openxmlformats.org/drawingml/2006/main" xmlns:r="http://schemas.openxmlformats.org/officeDocument/2006/relationships" xmlns:p="http://schemas.openxmlformats.org/presentationml/2006/main">
+  <p:cSld>
+    <p:spTree>
+      <p:nvGrpSpPr>
+        <p:cNvPr id="1" name=""/>
+        <p:cNvGrpSpPr/>
+        <p:nvPr/>
+      </p:nvGrpSpPr>
+      <p:grpSpPr>
+        <a:xfrm>
+          <a:off x="0" y="0"/>
+          <a:ext cx="0" cy="0"/>
+          <a:chOff x="0" y="0"/>
+          <a:chExt cx="0" cy="0"/>
+        </a:xfrm>
+      </p:grpSpPr>
+      <p:pic>
+        <p:nvPicPr>
+          <p:cNvPr id="2051" name="Picture 3"/>
+          <p:cNvPicPr>
+            <a:picLocks noChangeAspect="1" noChangeArrowheads="1"/>
+          </p:cNvPicPr>
+          <p:nvPr/>
+        </p:nvPicPr>
+        <p:blipFill>
+          <a:blip r:embed="rId2">
+            <a:extLst>
+              <a:ext uri="{28A0092B-C50C-407E-A947-70E740481C1C}">
+                <a14:useLocalDpi xmlns:a14="http://schemas.microsoft.com/office/drawing/2010/main" val="0"/>
+              </a:ext>
+            </a:extLst>
+          </a:blip>
+          <a:srcRect/>
+          <a:stretch>
+            <a:fillRect/>
+          </a:stretch>
+        </p:blipFill>
+        <p:spPr bwMode="auto">
+          <a:xfrm>
+            <a:off x="2057400" y="1905001"/>
+            <a:ext cx="4942703" cy="4953000"/>
+          </a:xfrm>
+          <a:prstGeom prst="rect">
+            <a:avLst/>
+          </a:prstGeom>
+          <a:noFill/>
+          <a:ln>
+            <a:noFill/>
+          </a:ln>
+          <a:extLst>
+            <a:ext uri="{909E8E84-426E-40DD-AFC4-6F175D3DCCD1}">
+              <a14:hiddenFill xmlns:a14="http://schemas.microsoft.com/office/drawing/2010/main">
+                <a:solidFill>
+                  <a:schemeClr val="accent1"/>
+                </a:solidFill>
+              </a14:hiddenFill>
+            </a:ext>
+            <a:ext uri="{91240B29-F687-4F45-9708-019B960494DF}">
+              <a14:hiddenLine xmlns:a14="http://schemas.microsoft.com/office/drawing/2010/main" w="9525">
+                <a:solidFill>
+                  <a:schemeClr val="tx1"/>
+                </a:solidFill>
+                <a:miter lim="800000"/>
+                <a:headEnd/>
+                <a:tailEnd/>
+              </a14:hiddenLine>
+            </a:ext>
+          </a:extLst>
+        </p:spPr>
+      </p:pic>
+      <p:sp>
+        <p:nvSpPr>
+          <p:cNvPr id="3" name="TextBox 2"/>
+          <p:cNvSpPr txBox="1"/>
+          <p:nvPr/>
+        </p:nvSpPr>
+        <p:spPr>
+          <a:xfrm>
+            <a:off x="0" y="-13195"/>
+            <a:ext cx="7585731" cy="1569660"/>
+          </a:xfrm>
+          <a:prstGeom prst="rect">
+            <a:avLst/>
+          </a:prstGeom>
+          <a:noFill/>
+        </p:spPr>
+        <p:txBody>
+          <a:bodyPr wrap="none" rtlCol="0">
+            <a:spAutoFit/>
+          </a:bodyPr>
+          <a:lstStyle/>
+          <a:p>
+            <a:r>
+              <a:rPr lang="ja-JP" altLang="en-US" sz="3200" dirty="0" smtClean="0"/>
+              <a:t>道路の生成（</a:t>
+            </a:r>
+            <a:r>
+              <a:rPr lang="en-US" altLang="ja-JP" sz="3200" dirty="0" smtClean="0"/>
+              <a:t>Avenue</a:t>
+            </a:r>
+            <a:r>
+              <a:rPr lang="ja-JP" altLang="en-US" sz="3200" dirty="0" smtClean="0"/>
+              <a:t>）</a:t>
+            </a:r>
+            <a:endParaRPr lang="en-US" altLang="ja-JP" sz="3200" dirty="0" smtClean="0"/>
+          </a:p>
+          <a:p>
+            <a:r>
+              <a:rPr lang="en-US" altLang="ja-JP" sz="3200" dirty="0" smtClean="0"/>
+              <a:t>Iteration: 5</a:t>
+            </a:r>
+          </a:p>
+          <a:p>
+            <a:r>
+              <a:rPr lang="en-US" altLang="ja-JP" sz="3200" dirty="0" smtClean="0"/>
+              <a:t>Snap: ON</a:t>
+            </a:r>
+            <a:r>
+              <a:rPr lang="ja-JP" altLang="en-US" sz="3200" dirty="0"/>
+              <a:t>　</a:t>
+            </a:r>
+            <a:r>
+              <a:rPr lang="ja-JP" altLang="en-US" sz="3200" dirty="0" smtClean="0"/>
+              <a:t>（</a:t>
+            </a:r>
+            <a:r>
+              <a:rPr lang="en-US" altLang="ja-JP" sz="3200" dirty="0" smtClean="0"/>
+              <a:t>10m</a:t>
+            </a:r>
+            <a:r>
+              <a:rPr lang="ja-JP" altLang="en-US" sz="3200" dirty="0" smtClean="0"/>
+              <a:t>。ただし、最後の点は</a:t>
+            </a:r>
+            <a:r>
+              <a:rPr lang="en-US" altLang="ja-JP" sz="3200" dirty="0" smtClean="0"/>
+              <a:t>40m</a:t>
+            </a:r>
+            <a:r>
+              <a:rPr lang="ja-JP" altLang="en-US" sz="3200" dirty="0" smtClean="0"/>
+              <a:t>）</a:t>
+            </a:r>
+            <a:endParaRPr lang="en-US" altLang="ja-JP" sz="3200" dirty="0" smtClean="0"/>
+          </a:p>
+        </p:txBody>
+      </p:sp>
+      <p:sp>
+        <p:nvSpPr>
+          <p:cNvPr id="4" name="TextBox 3"/>
+          <p:cNvSpPr txBox="1"/>
+          <p:nvPr/>
+        </p:nvSpPr>
+        <p:spPr>
+          <a:xfrm>
+            <a:off x="3397441" y="4240840"/>
+            <a:ext cx="301686" cy="369332"/>
+          </a:xfrm>
+          <a:prstGeom prst="rect">
+            <a:avLst/>
+          </a:prstGeom>
+          <a:noFill/>
+        </p:spPr>
+        <p:txBody>
+          <a:bodyPr wrap="none" rtlCol="0">
+            <a:spAutoFit/>
+          </a:bodyPr>
+          <a:lstStyle/>
+          <a:p>
+            <a:r>
+              <a:rPr lang="en-US" dirty="0" smtClean="0"/>
+              <a:t>4</a:t>
+            </a:r>
+            <a:endParaRPr lang="en-US" dirty="0"/>
+          </a:p>
+        </p:txBody>
+      </p:sp>
+      <p:sp>
+        <p:nvSpPr>
+          <p:cNvPr id="5" name="TextBox 4"/>
+          <p:cNvSpPr txBox="1"/>
+          <p:nvPr/>
+        </p:nvSpPr>
+        <p:spPr>
+          <a:xfrm>
+            <a:off x="3333176" y="3871508"/>
+            <a:ext cx="301686" cy="369332"/>
+          </a:xfrm>
+          <a:prstGeom prst="rect">
+            <a:avLst/>
+          </a:prstGeom>
+          <a:noFill/>
+        </p:spPr>
+        <p:txBody>
+          <a:bodyPr wrap="none" rtlCol="0">
+            <a:spAutoFit/>
+          </a:bodyPr>
+          <a:lstStyle/>
+          <a:p>
+            <a:r>
+              <a:rPr lang="en-US" dirty="0" smtClean="0"/>
+              <a:t>5</a:t>
+            </a:r>
+            <a:endParaRPr lang="en-US" dirty="0"/>
+          </a:p>
+        </p:txBody>
+      </p:sp>
+      <p:sp>
+        <p:nvSpPr>
+          <p:cNvPr id="6" name="TextBox 5"/>
+          <p:cNvSpPr txBox="1"/>
+          <p:nvPr/>
+        </p:nvSpPr>
+        <p:spPr>
+          <a:xfrm>
+            <a:off x="5377084" y="4019922"/>
+            <a:ext cx="301686" cy="369332"/>
+          </a:xfrm>
+          <a:prstGeom prst="rect">
+            <a:avLst/>
+          </a:prstGeom>
+          <a:noFill/>
+        </p:spPr>
+        <p:txBody>
+          <a:bodyPr wrap="none" rtlCol="0">
+            <a:spAutoFit/>
+          </a:bodyPr>
+          <a:lstStyle/>
+          <a:p>
+            <a:r>
+              <a:rPr lang="en-US" dirty="0" smtClean="0"/>
+              <a:t>6</a:t>
+            </a:r>
+            <a:endParaRPr lang="en-US" dirty="0"/>
+          </a:p>
+        </p:txBody>
+      </p:sp>
+      <p:sp>
+        <p:nvSpPr>
+          <p:cNvPr id="7" name="TextBox 6"/>
+          <p:cNvSpPr txBox="1"/>
+          <p:nvPr/>
+        </p:nvSpPr>
+        <p:spPr>
+          <a:xfrm>
+            <a:off x="3484019" y="4762572"/>
+            <a:ext cx="301686" cy="369332"/>
+          </a:xfrm>
+          <a:prstGeom prst="rect">
+            <a:avLst/>
+          </a:prstGeom>
+          <a:noFill/>
+        </p:spPr>
+        <p:txBody>
+          <a:bodyPr wrap="none" rtlCol="0">
+            <a:spAutoFit/>
+          </a:bodyPr>
+          <a:lstStyle/>
+          <a:p>
+            <a:r>
+              <a:rPr lang="en-US" dirty="0" smtClean="0"/>
+              <a:t>7</a:t>
+            </a:r>
+            <a:endParaRPr lang="en-US" dirty="0"/>
+          </a:p>
+        </p:txBody>
+      </p:sp>
+      <p:sp>
+        <p:nvSpPr>
+          <p:cNvPr id="8" name="TextBox 7"/>
+          <p:cNvSpPr txBox="1"/>
+          <p:nvPr/>
+        </p:nvSpPr>
+        <p:spPr>
+          <a:xfrm>
+            <a:off x="5450619" y="3433658"/>
+            <a:ext cx="301686" cy="369332"/>
+          </a:xfrm>
+          <a:prstGeom prst="rect">
+            <a:avLst/>
+          </a:prstGeom>
+          <a:noFill/>
+        </p:spPr>
+        <p:txBody>
+          <a:bodyPr wrap="none" rtlCol="0">
+            <a:spAutoFit/>
+          </a:bodyPr>
+          <a:lstStyle/>
+          <a:p>
+            <a:r>
+              <a:rPr lang="en-US" dirty="0" smtClean="0"/>
+              <a:t>8</a:t>
+            </a:r>
+            <a:endParaRPr lang="en-US" dirty="0"/>
+          </a:p>
+        </p:txBody>
+      </p:sp>
+      <p:sp>
+        <p:nvSpPr>
+          <p:cNvPr id="9" name="TextBox 8"/>
+          <p:cNvSpPr txBox="1"/>
+          <p:nvPr/>
+        </p:nvSpPr>
+        <p:spPr>
+          <a:xfrm>
+            <a:off x="3182333" y="2654074"/>
+            <a:ext cx="301686" cy="369332"/>
+          </a:xfrm>
+          <a:prstGeom prst="rect">
+            <a:avLst/>
+          </a:prstGeom>
+          <a:noFill/>
+        </p:spPr>
+        <p:txBody>
+          <a:bodyPr wrap="none" rtlCol="0">
+            <a:spAutoFit/>
+          </a:bodyPr>
+          <a:lstStyle/>
+          <a:p>
+            <a:r>
+              <a:rPr lang="en-US" dirty="0" smtClean="0"/>
+              <a:t>9</a:t>
+            </a:r>
+            <a:endParaRPr lang="en-US" dirty="0"/>
+          </a:p>
+        </p:txBody>
+      </p:sp>
+      <p:sp>
+        <p:nvSpPr>
+          <p:cNvPr id="10" name="TextBox 9"/>
+          <p:cNvSpPr txBox="1"/>
+          <p:nvPr/>
+        </p:nvSpPr>
+        <p:spPr>
+          <a:xfrm>
+            <a:off x="1752600" y="4205639"/>
+            <a:ext cx="418704" cy="369332"/>
+          </a:xfrm>
+          <a:prstGeom prst="rect">
+            <a:avLst/>
+          </a:prstGeom>
+          <a:noFill/>
+        </p:spPr>
+        <p:txBody>
+          <a:bodyPr wrap="none" rtlCol="0">
+            <a:spAutoFit/>
+          </a:bodyPr>
+          <a:lstStyle/>
+          <a:p>
+            <a:r>
+              <a:rPr lang="en-US" dirty="0" smtClean="0"/>
+              <a:t>10</a:t>
+            </a:r>
+            <a:endParaRPr lang="en-US" dirty="0"/>
+          </a:p>
+        </p:txBody>
+      </p:sp>
+      <p:sp>
+        <p:nvSpPr>
+          <p:cNvPr id="12" name="TextBox 11"/>
+          <p:cNvSpPr txBox="1"/>
+          <p:nvPr/>
+        </p:nvSpPr>
+        <p:spPr>
+          <a:xfrm>
+            <a:off x="5034167" y="2318266"/>
+            <a:ext cx="418704" cy="369332"/>
+          </a:xfrm>
+          <a:prstGeom prst="rect">
+            <a:avLst/>
+          </a:prstGeom>
+          <a:noFill/>
+        </p:spPr>
+        <p:txBody>
+          <a:bodyPr wrap="none" rtlCol="0">
+            <a:spAutoFit/>
+          </a:bodyPr>
+          <a:lstStyle/>
+          <a:p>
+            <a:r>
+              <a:rPr lang="en-US" dirty="0" smtClean="0"/>
+              <a:t>20</a:t>
+            </a:r>
+            <a:endParaRPr lang="en-US" dirty="0"/>
+          </a:p>
+        </p:txBody>
+      </p:sp>
+      <p:sp>
+        <p:nvSpPr>
+          <p:cNvPr id="13" name="TextBox 12"/>
+          <p:cNvSpPr txBox="1"/>
+          <p:nvPr/>
+        </p:nvSpPr>
+        <p:spPr>
+          <a:xfrm>
+            <a:off x="6477000" y="3284033"/>
+            <a:ext cx="418704" cy="369332"/>
+          </a:xfrm>
+          <a:prstGeom prst="rect">
+            <a:avLst/>
+          </a:prstGeom>
+          <a:noFill/>
+        </p:spPr>
+        <p:txBody>
+          <a:bodyPr wrap="none" rtlCol="0">
+            <a:spAutoFit/>
+          </a:bodyPr>
+          <a:lstStyle/>
+          <a:p>
+            <a:r>
+              <a:rPr lang="en-US" dirty="0" smtClean="0"/>
+              <a:t>19</a:t>
+            </a:r>
+            <a:endParaRPr lang="en-US" dirty="0"/>
+          </a:p>
+        </p:txBody>
+      </p:sp>
+      <p:sp>
+        <p:nvSpPr>
+          <p:cNvPr id="14" name="TextBox 13"/>
+          <p:cNvSpPr txBox="1"/>
+          <p:nvPr/>
+        </p:nvSpPr>
+        <p:spPr>
+          <a:xfrm>
+            <a:off x="3914131" y="6096000"/>
+            <a:ext cx="418704" cy="369332"/>
+          </a:xfrm>
+          <a:prstGeom prst="rect">
+            <a:avLst/>
+          </a:prstGeom>
+          <a:noFill/>
+        </p:spPr>
+        <p:txBody>
+          <a:bodyPr wrap="none" rtlCol="0">
+            <a:spAutoFit/>
+          </a:bodyPr>
+          <a:lstStyle/>
+          <a:p>
+            <a:r>
+              <a:rPr lang="en-US" dirty="0" smtClean="0"/>
+              <a:t>15</a:t>
+            </a:r>
+            <a:endParaRPr lang="en-US" dirty="0"/>
+          </a:p>
+        </p:txBody>
+      </p:sp>
+      <p:sp>
+        <p:nvSpPr>
+          <p:cNvPr id="15" name="TextBox 14"/>
+          <p:cNvSpPr txBox="1"/>
+          <p:nvPr/>
+        </p:nvSpPr>
+        <p:spPr>
+          <a:xfrm>
+            <a:off x="1490026" y="4906618"/>
+            <a:ext cx="418704" cy="369332"/>
+          </a:xfrm>
+          <a:prstGeom prst="rect">
+            <a:avLst/>
+          </a:prstGeom>
+          <a:noFill/>
+        </p:spPr>
+        <p:txBody>
+          <a:bodyPr wrap="none" rtlCol="0">
+            <a:spAutoFit/>
+          </a:bodyPr>
+          <a:lstStyle/>
+          <a:p>
+            <a:r>
+              <a:rPr lang="en-US" dirty="0" smtClean="0"/>
+              <a:t>16</a:t>
+            </a:r>
+            <a:endParaRPr lang="en-US" dirty="0"/>
+          </a:p>
+        </p:txBody>
+      </p:sp>
+      <p:sp>
+        <p:nvSpPr>
+          <p:cNvPr id="16" name="TextBox 15"/>
+          <p:cNvSpPr txBox="1"/>
+          <p:nvPr/>
+        </p:nvSpPr>
+        <p:spPr>
+          <a:xfrm>
+            <a:off x="5333601" y="4372498"/>
+            <a:ext cx="418704" cy="369332"/>
+          </a:xfrm>
+          <a:prstGeom prst="rect">
+            <a:avLst/>
+          </a:prstGeom>
+          <a:noFill/>
+        </p:spPr>
+        <p:txBody>
+          <a:bodyPr wrap="none" rtlCol="0">
+            <a:spAutoFit/>
+          </a:bodyPr>
+          <a:lstStyle/>
+          <a:p>
+            <a:r>
+              <a:rPr lang="en-US" dirty="0" smtClean="0"/>
+              <a:t>14</a:t>
+            </a:r>
+            <a:endParaRPr lang="en-US" dirty="0"/>
+          </a:p>
+        </p:txBody>
+      </p:sp>
+      <p:sp>
+        <p:nvSpPr>
+          <p:cNvPr id="17" name="Oval 16"/>
+          <p:cNvSpPr/>
+          <p:nvPr/>
+        </p:nvSpPr>
+        <p:spPr>
+          <a:xfrm>
+            <a:off x="5181600" y="3690346"/>
+            <a:ext cx="304800" cy="304800"/>
+          </a:xfrm>
+          <a:prstGeom prst="ellipse">
+            <a:avLst/>
+          </a:prstGeom>
+          <a:noFill/>
+          <a:ln>
+            <a:prstDash val="sysDash"/>
+          </a:ln>
+        </p:spPr>
+        <p:style>
+          <a:lnRef idx="2">
+            <a:schemeClr val="accent1">
+              <a:shade val="50000"/>
+            </a:schemeClr>
+          </a:lnRef>
+          <a:fillRef idx="1">
+            <a:schemeClr val="accent1"/>
+          </a:fillRef>
+          <a:effectRef idx="0">
+            <a:schemeClr val="accent1"/>
+          </a:effectRef>
+          <a:fontRef idx="minor">
+            <a:schemeClr val="lt1"/>
+          </a:fontRef>
+        </p:style>
+        <p:txBody>
+          <a:bodyPr rtlCol="0" anchor="ctr"/>
+          <a:lstStyle/>
+          <a:p>
+            <a:pPr algn="ctr"/>
+            <a:endParaRPr lang="en-US"/>
+          </a:p>
+        </p:txBody>
+      </p:sp>
+    </p:spTree>
+    <p:extLst>
+      <p:ext uri="{BB962C8B-B14F-4D97-AF65-F5344CB8AC3E}">
+        <p14:creationId xmlns:p14="http://schemas.microsoft.com/office/powerpoint/2010/main" val="2783273200"/>
+      </p:ext>
+    </p:extLst>
+  </p:cSld>
+  <p:clrMapOvr>
+    <a:masterClrMapping/>
+  </p:clrMapOvr>
+</p:sld>
+</file>
+
+<file path=ppt/slides/slide50.xml><?xml version="1.0" encoding="utf-8"?>
 <p:sld xmlns:a="http://schemas.openxmlformats.org/drawingml/2006/main" xmlns:r="http://schemas.openxmlformats.org/officeDocument/2006/relationships" xmlns:p="http://schemas.openxmlformats.org/presentationml/2006/main">
   <p:cSld>
     <p:spTree>
@@ -14916,7 +17113,7 @@
 </p:sld>
 </file>
 
-<file path=ppt/slides/slide46.xml><?xml version="1.0" encoding="utf-8"?>
+<file path=ppt/slides/slide51.xml><?xml version="1.0" encoding="utf-8"?>
 <p:sld xmlns:a="http://schemas.openxmlformats.org/drawingml/2006/main" xmlns:r="http://schemas.openxmlformats.org/officeDocument/2006/relationships" xmlns:p="http://schemas.openxmlformats.org/presentationml/2006/main">
   <p:cSld>
     <p:spTree>
@@ -15830,7 +18027,7 @@
 </p:sld>
 </file>
 
-<file path=ppt/slides/slide47.xml><?xml version="1.0" encoding="utf-8"?>
+<file path=ppt/slides/slide52.xml><?xml version="1.0" encoding="utf-8"?>
 <p:sld xmlns:a="http://schemas.openxmlformats.org/drawingml/2006/main" xmlns:r="http://schemas.openxmlformats.org/officeDocument/2006/relationships" xmlns:p="http://schemas.openxmlformats.org/presentationml/2006/main">
   <p:cSld>
     <p:spTree>
@@ -16373,7 +18570,7 @@
 </p:sld>
 </file>
 
-<file path=ppt/slides/slide48.xml><?xml version="1.0" encoding="utf-8"?>
+<file path=ppt/slides/slide53.xml><?xml version="1.0" encoding="utf-8"?>
 <p:sld xmlns:a="http://schemas.openxmlformats.org/drawingml/2006/main" xmlns:r="http://schemas.openxmlformats.org/officeDocument/2006/relationships" xmlns:p="http://schemas.openxmlformats.org/presentationml/2006/main">
   <p:cSld>
     <p:spTree>
@@ -16887,7 +19084,7 @@
 </p:sld>
 </file>
 
-<file path=ppt/slides/slide49.xml><?xml version="1.0" encoding="utf-8"?>
+<file path=ppt/slides/slide54.xml><?xml version="1.0" encoding="utf-8"?>
 <p:sld xmlns:a="http://schemas.openxmlformats.org/drawingml/2006/main" xmlns:r="http://schemas.openxmlformats.org/officeDocument/2006/relationships" xmlns:p="http://schemas.openxmlformats.org/presentationml/2006/main">
   <p:cSld>
     <p:spTree>
@@ -17341,570 +19538,7 @@
 </p:sld>
 </file>
 
-<file path=ppt/slides/slide5.xml><?xml version="1.0" encoding="utf-8"?>
-<p:sld xmlns:a="http://schemas.openxmlformats.org/drawingml/2006/main" xmlns:r="http://schemas.openxmlformats.org/officeDocument/2006/relationships" xmlns:p="http://schemas.openxmlformats.org/presentationml/2006/main">
-  <p:cSld>
-    <p:spTree>
-      <p:nvGrpSpPr>
-        <p:cNvPr id="1" name=""/>
-        <p:cNvGrpSpPr/>
-        <p:nvPr/>
-      </p:nvGrpSpPr>
-      <p:grpSpPr>
-        <a:xfrm>
-          <a:off x="0" y="0"/>
-          <a:ext cx="0" cy="0"/>
-          <a:chOff x="0" y="0"/>
-          <a:chExt cx="0" cy="0"/>
-        </a:xfrm>
-      </p:grpSpPr>
-      <p:pic>
-        <p:nvPicPr>
-          <p:cNvPr id="2051" name="Picture 3"/>
-          <p:cNvPicPr>
-            <a:picLocks noChangeAspect="1" noChangeArrowheads="1"/>
-          </p:cNvPicPr>
-          <p:nvPr/>
-        </p:nvPicPr>
-        <p:blipFill>
-          <a:blip r:embed="rId2">
-            <a:extLst>
-              <a:ext uri="{28A0092B-C50C-407E-A947-70E740481C1C}">
-                <a14:useLocalDpi xmlns:a14="http://schemas.microsoft.com/office/drawing/2010/main" val="0"/>
-              </a:ext>
-            </a:extLst>
-          </a:blip>
-          <a:srcRect/>
-          <a:stretch>
-            <a:fillRect/>
-          </a:stretch>
-        </p:blipFill>
-        <p:spPr bwMode="auto">
-          <a:xfrm>
-            <a:off x="2057400" y="1905001"/>
-            <a:ext cx="4942703" cy="4953000"/>
-          </a:xfrm>
-          <a:prstGeom prst="rect">
-            <a:avLst/>
-          </a:prstGeom>
-          <a:noFill/>
-          <a:ln>
-            <a:noFill/>
-          </a:ln>
-          <a:extLst>
-            <a:ext uri="{909E8E84-426E-40DD-AFC4-6F175D3DCCD1}">
-              <a14:hiddenFill xmlns:a14="http://schemas.microsoft.com/office/drawing/2010/main">
-                <a:solidFill>
-                  <a:schemeClr val="accent1"/>
-                </a:solidFill>
-              </a14:hiddenFill>
-            </a:ext>
-            <a:ext uri="{91240B29-F687-4F45-9708-019B960494DF}">
-              <a14:hiddenLine xmlns:a14="http://schemas.microsoft.com/office/drawing/2010/main" w="9525">
-                <a:solidFill>
-                  <a:schemeClr val="tx1"/>
-                </a:solidFill>
-                <a:miter lim="800000"/>
-                <a:headEnd/>
-                <a:tailEnd/>
-              </a14:hiddenLine>
-            </a:ext>
-          </a:extLst>
-        </p:spPr>
-      </p:pic>
-      <p:sp>
-        <p:nvSpPr>
-          <p:cNvPr id="3" name="TextBox 2"/>
-          <p:cNvSpPr txBox="1"/>
-          <p:nvPr/>
-        </p:nvSpPr>
-        <p:spPr>
-          <a:xfrm>
-            <a:off x="0" y="-13195"/>
-            <a:ext cx="7585731" cy="1569660"/>
-          </a:xfrm>
-          <a:prstGeom prst="rect">
-            <a:avLst/>
-          </a:prstGeom>
-          <a:noFill/>
-        </p:spPr>
-        <p:txBody>
-          <a:bodyPr wrap="none" rtlCol="0">
-            <a:spAutoFit/>
-          </a:bodyPr>
-          <a:lstStyle/>
-          <a:p>
-            <a:r>
-              <a:rPr lang="ja-JP" altLang="en-US" sz="3200" dirty="0" smtClean="0"/>
-              <a:t>道路の生成（</a:t>
-            </a:r>
-            <a:r>
-              <a:rPr lang="en-US" altLang="ja-JP" sz="3200" dirty="0" smtClean="0"/>
-              <a:t>Avenue</a:t>
-            </a:r>
-            <a:r>
-              <a:rPr lang="ja-JP" altLang="en-US" sz="3200" dirty="0" smtClean="0"/>
-              <a:t>）</a:t>
-            </a:r>
-            <a:endParaRPr lang="en-US" altLang="ja-JP" sz="3200" dirty="0" smtClean="0"/>
-          </a:p>
-          <a:p>
-            <a:r>
-              <a:rPr lang="en-US" altLang="ja-JP" sz="3200" dirty="0" smtClean="0"/>
-              <a:t>Iteration: 5</a:t>
-            </a:r>
-          </a:p>
-          <a:p>
-            <a:r>
-              <a:rPr lang="en-US" altLang="ja-JP" sz="3200" dirty="0" smtClean="0"/>
-              <a:t>Snap: ON</a:t>
-            </a:r>
-            <a:r>
-              <a:rPr lang="ja-JP" altLang="en-US" sz="3200" dirty="0"/>
-              <a:t>　</a:t>
-            </a:r>
-            <a:r>
-              <a:rPr lang="ja-JP" altLang="en-US" sz="3200" dirty="0" smtClean="0"/>
-              <a:t>（</a:t>
-            </a:r>
-            <a:r>
-              <a:rPr lang="en-US" altLang="ja-JP" sz="3200" dirty="0" smtClean="0"/>
-              <a:t>10m</a:t>
-            </a:r>
-            <a:r>
-              <a:rPr lang="ja-JP" altLang="en-US" sz="3200" dirty="0" smtClean="0"/>
-              <a:t>。ただし、最後の点は</a:t>
-            </a:r>
-            <a:r>
-              <a:rPr lang="en-US" altLang="ja-JP" sz="3200" dirty="0" smtClean="0"/>
-              <a:t>40m</a:t>
-            </a:r>
-            <a:r>
-              <a:rPr lang="ja-JP" altLang="en-US" sz="3200" dirty="0" smtClean="0"/>
-              <a:t>）</a:t>
-            </a:r>
-            <a:endParaRPr lang="en-US" altLang="ja-JP" sz="3200" dirty="0" smtClean="0"/>
-          </a:p>
-        </p:txBody>
-      </p:sp>
-      <p:sp>
-        <p:nvSpPr>
-          <p:cNvPr id="4" name="TextBox 3"/>
-          <p:cNvSpPr txBox="1"/>
-          <p:nvPr/>
-        </p:nvSpPr>
-        <p:spPr>
-          <a:xfrm>
-            <a:off x="3397441" y="4240840"/>
-            <a:ext cx="301686" cy="369332"/>
-          </a:xfrm>
-          <a:prstGeom prst="rect">
-            <a:avLst/>
-          </a:prstGeom>
-          <a:noFill/>
-        </p:spPr>
-        <p:txBody>
-          <a:bodyPr wrap="none" rtlCol="0">
-            <a:spAutoFit/>
-          </a:bodyPr>
-          <a:lstStyle/>
-          <a:p>
-            <a:r>
-              <a:rPr lang="en-US" dirty="0" smtClean="0"/>
-              <a:t>4</a:t>
-            </a:r>
-            <a:endParaRPr lang="en-US" dirty="0"/>
-          </a:p>
-        </p:txBody>
-      </p:sp>
-      <p:sp>
-        <p:nvSpPr>
-          <p:cNvPr id="5" name="TextBox 4"/>
-          <p:cNvSpPr txBox="1"/>
-          <p:nvPr/>
-        </p:nvSpPr>
-        <p:spPr>
-          <a:xfrm>
-            <a:off x="3333176" y="3871508"/>
-            <a:ext cx="301686" cy="369332"/>
-          </a:xfrm>
-          <a:prstGeom prst="rect">
-            <a:avLst/>
-          </a:prstGeom>
-          <a:noFill/>
-        </p:spPr>
-        <p:txBody>
-          <a:bodyPr wrap="none" rtlCol="0">
-            <a:spAutoFit/>
-          </a:bodyPr>
-          <a:lstStyle/>
-          <a:p>
-            <a:r>
-              <a:rPr lang="en-US" dirty="0" smtClean="0"/>
-              <a:t>5</a:t>
-            </a:r>
-            <a:endParaRPr lang="en-US" dirty="0"/>
-          </a:p>
-        </p:txBody>
-      </p:sp>
-      <p:sp>
-        <p:nvSpPr>
-          <p:cNvPr id="6" name="TextBox 5"/>
-          <p:cNvSpPr txBox="1"/>
-          <p:nvPr/>
-        </p:nvSpPr>
-        <p:spPr>
-          <a:xfrm>
-            <a:off x="5377084" y="4019922"/>
-            <a:ext cx="301686" cy="369332"/>
-          </a:xfrm>
-          <a:prstGeom prst="rect">
-            <a:avLst/>
-          </a:prstGeom>
-          <a:noFill/>
-        </p:spPr>
-        <p:txBody>
-          <a:bodyPr wrap="none" rtlCol="0">
-            <a:spAutoFit/>
-          </a:bodyPr>
-          <a:lstStyle/>
-          <a:p>
-            <a:r>
-              <a:rPr lang="en-US" dirty="0" smtClean="0"/>
-              <a:t>6</a:t>
-            </a:r>
-            <a:endParaRPr lang="en-US" dirty="0"/>
-          </a:p>
-        </p:txBody>
-      </p:sp>
-      <p:sp>
-        <p:nvSpPr>
-          <p:cNvPr id="7" name="TextBox 6"/>
-          <p:cNvSpPr txBox="1"/>
-          <p:nvPr/>
-        </p:nvSpPr>
-        <p:spPr>
-          <a:xfrm>
-            <a:off x="3484019" y="4762572"/>
-            <a:ext cx="301686" cy="369332"/>
-          </a:xfrm>
-          <a:prstGeom prst="rect">
-            <a:avLst/>
-          </a:prstGeom>
-          <a:noFill/>
-        </p:spPr>
-        <p:txBody>
-          <a:bodyPr wrap="none" rtlCol="0">
-            <a:spAutoFit/>
-          </a:bodyPr>
-          <a:lstStyle/>
-          <a:p>
-            <a:r>
-              <a:rPr lang="en-US" dirty="0" smtClean="0"/>
-              <a:t>7</a:t>
-            </a:r>
-            <a:endParaRPr lang="en-US" dirty="0"/>
-          </a:p>
-        </p:txBody>
-      </p:sp>
-      <p:sp>
-        <p:nvSpPr>
-          <p:cNvPr id="8" name="TextBox 7"/>
-          <p:cNvSpPr txBox="1"/>
-          <p:nvPr/>
-        </p:nvSpPr>
-        <p:spPr>
-          <a:xfrm>
-            <a:off x="5450619" y="3433658"/>
-            <a:ext cx="301686" cy="369332"/>
-          </a:xfrm>
-          <a:prstGeom prst="rect">
-            <a:avLst/>
-          </a:prstGeom>
-          <a:noFill/>
-        </p:spPr>
-        <p:txBody>
-          <a:bodyPr wrap="none" rtlCol="0">
-            <a:spAutoFit/>
-          </a:bodyPr>
-          <a:lstStyle/>
-          <a:p>
-            <a:r>
-              <a:rPr lang="en-US" dirty="0" smtClean="0"/>
-              <a:t>8</a:t>
-            </a:r>
-            <a:endParaRPr lang="en-US" dirty="0"/>
-          </a:p>
-        </p:txBody>
-      </p:sp>
-      <p:sp>
-        <p:nvSpPr>
-          <p:cNvPr id="9" name="TextBox 8"/>
-          <p:cNvSpPr txBox="1"/>
-          <p:nvPr/>
-        </p:nvSpPr>
-        <p:spPr>
-          <a:xfrm>
-            <a:off x="3182333" y="2654074"/>
-            <a:ext cx="301686" cy="369332"/>
-          </a:xfrm>
-          <a:prstGeom prst="rect">
-            <a:avLst/>
-          </a:prstGeom>
-          <a:noFill/>
-        </p:spPr>
-        <p:txBody>
-          <a:bodyPr wrap="none" rtlCol="0">
-            <a:spAutoFit/>
-          </a:bodyPr>
-          <a:lstStyle/>
-          <a:p>
-            <a:r>
-              <a:rPr lang="en-US" dirty="0" smtClean="0"/>
-              <a:t>9</a:t>
-            </a:r>
-            <a:endParaRPr lang="en-US" dirty="0"/>
-          </a:p>
-        </p:txBody>
-      </p:sp>
-      <p:sp>
-        <p:nvSpPr>
-          <p:cNvPr id="10" name="TextBox 9"/>
-          <p:cNvSpPr txBox="1"/>
-          <p:nvPr/>
-        </p:nvSpPr>
-        <p:spPr>
-          <a:xfrm>
-            <a:off x="1752600" y="4205639"/>
-            <a:ext cx="418704" cy="369332"/>
-          </a:xfrm>
-          <a:prstGeom prst="rect">
-            <a:avLst/>
-          </a:prstGeom>
-          <a:noFill/>
-        </p:spPr>
-        <p:txBody>
-          <a:bodyPr wrap="none" rtlCol="0">
-            <a:spAutoFit/>
-          </a:bodyPr>
-          <a:lstStyle/>
-          <a:p>
-            <a:r>
-              <a:rPr lang="en-US" dirty="0" smtClean="0"/>
-              <a:t>10</a:t>
-            </a:r>
-            <a:endParaRPr lang="en-US" dirty="0"/>
-          </a:p>
-        </p:txBody>
-      </p:sp>
-      <p:sp>
-        <p:nvSpPr>
-          <p:cNvPr id="12" name="TextBox 11"/>
-          <p:cNvSpPr txBox="1"/>
-          <p:nvPr/>
-        </p:nvSpPr>
-        <p:spPr>
-          <a:xfrm>
-            <a:off x="5034167" y="2318266"/>
-            <a:ext cx="418704" cy="369332"/>
-          </a:xfrm>
-          <a:prstGeom prst="rect">
-            <a:avLst/>
-          </a:prstGeom>
-          <a:noFill/>
-        </p:spPr>
-        <p:txBody>
-          <a:bodyPr wrap="none" rtlCol="0">
-            <a:spAutoFit/>
-          </a:bodyPr>
-          <a:lstStyle/>
-          <a:p>
-            <a:r>
-              <a:rPr lang="en-US" dirty="0" smtClean="0"/>
-              <a:t>20</a:t>
-            </a:r>
-            <a:endParaRPr lang="en-US" dirty="0"/>
-          </a:p>
-        </p:txBody>
-      </p:sp>
-      <p:sp>
-        <p:nvSpPr>
-          <p:cNvPr id="13" name="TextBox 12"/>
-          <p:cNvSpPr txBox="1"/>
-          <p:nvPr/>
-        </p:nvSpPr>
-        <p:spPr>
-          <a:xfrm>
-            <a:off x="6477000" y="3284033"/>
-            <a:ext cx="418704" cy="369332"/>
-          </a:xfrm>
-          <a:prstGeom prst="rect">
-            <a:avLst/>
-          </a:prstGeom>
-          <a:noFill/>
-        </p:spPr>
-        <p:txBody>
-          <a:bodyPr wrap="none" rtlCol="0">
-            <a:spAutoFit/>
-          </a:bodyPr>
-          <a:lstStyle/>
-          <a:p>
-            <a:r>
-              <a:rPr lang="en-US" dirty="0" smtClean="0"/>
-              <a:t>19</a:t>
-            </a:r>
-            <a:endParaRPr lang="en-US" dirty="0"/>
-          </a:p>
-        </p:txBody>
-      </p:sp>
-      <p:sp>
-        <p:nvSpPr>
-          <p:cNvPr id="14" name="TextBox 13"/>
-          <p:cNvSpPr txBox="1"/>
-          <p:nvPr/>
-        </p:nvSpPr>
-        <p:spPr>
-          <a:xfrm>
-            <a:off x="3914131" y="6096000"/>
-            <a:ext cx="418704" cy="369332"/>
-          </a:xfrm>
-          <a:prstGeom prst="rect">
-            <a:avLst/>
-          </a:prstGeom>
-          <a:noFill/>
-        </p:spPr>
-        <p:txBody>
-          <a:bodyPr wrap="none" rtlCol="0">
-            <a:spAutoFit/>
-          </a:bodyPr>
-          <a:lstStyle/>
-          <a:p>
-            <a:r>
-              <a:rPr lang="en-US" dirty="0" smtClean="0"/>
-              <a:t>15</a:t>
-            </a:r>
-            <a:endParaRPr lang="en-US" dirty="0"/>
-          </a:p>
-        </p:txBody>
-      </p:sp>
-      <p:sp>
-        <p:nvSpPr>
-          <p:cNvPr id="15" name="TextBox 14"/>
-          <p:cNvSpPr txBox="1"/>
-          <p:nvPr/>
-        </p:nvSpPr>
-        <p:spPr>
-          <a:xfrm>
-            <a:off x="1490026" y="4906618"/>
-            <a:ext cx="418704" cy="369332"/>
-          </a:xfrm>
-          <a:prstGeom prst="rect">
-            <a:avLst/>
-          </a:prstGeom>
-          <a:noFill/>
-        </p:spPr>
-        <p:txBody>
-          <a:bodyPr wrap="none" rtlCol="0">
-            <a:spAutoFit/>
-          </a:bodyPr>
-          <a:lstStyle/>
-          <a:p>
-            <a:r>
-              <a:rPr lang="en-US" dirty="0" smtClean="0"/>
-              <a:t>16</a:t>
-            </a:r>
-            <a:endParaRPr lang="en-US" dirty="0"/>
-          </a:p>
-        </p:txBody>
-      </p:sp>
-      <p:sp>
-        <p:nvSpPr>
-          <p:cNvPr id="16" name="TextBox 15"/>
-          <p:cNvSpPr txBox="1"/>
-          <p:nvPr/>
-        </p:nvSpPr>
-        <p:spPr>
-          <a:xfrm>
-            <a:off x="5333601" y="4372498"/>
-            <a:ext cx="418704" cy="369332"/>
-          </a:xfrm>
-          <a:prstGeom prst="rect">
-            <a:avLst/>
-          </a:prstGeom>
-          <a:noFill/>
-        </p:spPr>
-        <p:txBody>
-          <a:bodyPr wrap="none" rtlCol="0">
-            <a:spAutoFit/>
-          </a:bodyPr>
-          <a:lstStyle/>
-          <a:p>
-            <a:r>
-              <a:rPr lang="en-US" dirty="0" smtClean="0"/>
-              <a:t>14</a:t>
-            </a:r>
-            <a:endParaRPr lang="en-US" dirty="0"/>
-          </a:p>
-        </p:txBody>
-      </p:sp>
-      <p:sp>
-        <p:nvSpPr>
-          <p:cNvPr id="17" name="Oval 16"/>
-          <p:cNvSpPr/>
-          <p:nvPr/>
-        </p:nvSpPr>
-        <p:spPr>
-          <a:xfrm>
-            <a:off x="5181600" y="3690346"/>
-            <a:ext cx="304800" cy="304800"/>
-          </a:xfrm>
-          <a:prstGeom prst="ellipse">
-            <a:avLst/>
-          </a:prstGeom>
-          <a:noFill/>
-          <a:ln>
-            <a:prstDash val="sysDash"/>
-          </a:ln>
-        </p:spPr>
-        <p:style>
-          <a:lnRef idx="2">
-            <a:schemeClr val="accent1">
-              <a:shade val="50000"/>
-            </a:schemeClr>
-          </a:lnRef>
-          <a:fillRef idx="1">
-            <a:schemeClr val="accent1"/>
-          </a:fillRef>
-          <a:effectRef idx="0">
-            <a:schemeClr val="accent1"/>
-          </a:effectRef>
-          <a:fontRef idx="minor">
-            <a:schemeClr val="lt1"/>
-          </a:fontRef>
-        </p:style>
-        <p:txBody>
-          <a:bodyPr rtlCol="0" anchor="ctr"/>
-          <a:lstStyle/>
-          <a:p>
-            <a:pPr algn="ctr"/>
-            <a:endParaRPr lang="en-US"/>
-          </a:p>
-        </p:txBody>
-      </p:sp>
-    </p:spTree>
-    <p:extLst>
-      <p:ext uri="{BB962C8B-B14F-4D97-AF65-F5344CB8AC3E}">
-        <p14:creationId xmlns:p14="http://schemas.microsoft.com/office/powerpoint/2010/main" val="2783273200"/>
-      </p:ext>
-    </p:extLst>
-  </p:cSld>
-  <p:clrMapOvr>
-    <a:masterClrMapping/>
-  </p:clrMapOvr>
-</p:sld>
-</file>
-
-<file path=ppt/slides/slide50.xml><?xml version="1.0" encoding="utf-8"?>
+<file path=ppt/slides/slide55.xml><?xml version="1.0" encoding="utf-8"?>
 <p:sld xmlns:a="http://schemas.openxmlformats.org/drawingml/2006/main" xmlns:r="http://schemas.openxmlformats.org/officeDocument/2006/relationships" xmlns:p="http://schemas.openxmlformats.org/presentationml/2006/main">
   <p:cSld>
     <p:spTree>

</xml_diff>